<commit_message>
kleine änderungen an den diagrammen
</commit_message>
<xml_diff>
--- a/01_Organisation/02_Meilensteine/m2/M2_Elek.pptx
+++ b/01_Organisation/02_Meilensteine/m2/M2_Elek.pptx
@@ -5,13 +5,21 @@
     <p:sldMasterId id="2147484208" r:id="rId1"/>
   </p:sldMasterIdLst>
   <p:notesMasterIdLst>
-    <p:notesMasterId r:id="rId6"/>
+    <p:notesMasterId r:id="rId14"/>
   </p:notesMasterIdLst>
   <p:sldIdLst>
     <p:sldId id="280" r:id="rId2"/>
     <p:sldId id="283" r:id="rId3"/>
     <p:sldId id="284" r:id="rId4"/>
-    <p:sldId id="285" r:id="rId5"/>
+    <p:sldId id="287" r:id="rId5"/>
+    <p:sldId id="288" r:id="rId6"/>
+    <p:sldId id="291" r:id="rId7"/>
+    <p:sldId id="292" r:id="rId8"/>
+    <p:sldId id="293" r:id="rId9"/>
+    <p:sldId id="286" r:id="rId10"/>
+    <p:sldId id="289" r:id="rId11"/>
+    <p:sldId id="290" r:id="rId12"/>
+    <p:sldId id="285" r:id="rId13"/>
   </p:sldIdLst>
   <p:sldSz cx="9144000" cy="6858000" type="screen4x3"/>
   <p:notesSz cx="6858000" cy="9144000"/>
@@ -211,7 +219,7 @@
           <a:p>
             <a:fld id="{056AEFA0-306F-4413-9CBC-3BA55C168B73}" type="datetimeFigureOut">
               <a:rPr lang="de-CH" smtClean="0"/>
-              <a:t>20.03.18</a:t>
+              <a:t>29.03.2018</a:t>
             </a:fld>
             <a:endParaRPr lang="de-CH"/>
           </a:p>
@@ -563,6 +571,594 @@
 </p:notes>
 </file>
 
+<file path=ppt/notesSlides/notesSlide2.xml><?xml version="1.0" encoding="utf-8"?>
+<p:notes xmlns:a="http://schemas.openxmlformats.org/drawingml/2006/main" xmlns:r="http://schemas.openxmlformats.org/officeDocument/2006/relationships" xmlns:p="http://schemas.openxmlformats.org/presentationml/2006/main">
+  <p:cSld>
+    <p:spTree>
+      <p:nvGrpSpPr>
+        <p:cNvPr id="1" name=""/>
+        <p:cNvGrpSpPr/>
+        <p:nvPr/>
+      </p:nvGrpSpPr>
+      <p:grpSpPr>
+        <a:xfrm>
+          <a:off x="0" y="0"/>
+          <a:ext cx="0" cy="0"/>
+          <a:chOff x="0" y="0"/>
+          <a:chExt cx="0" cy="0"/>
+        </a:xfrm>
+      </p:grpSpPr>
+      <p:sp>
+        <p:nvSpPr>
+          <p:cNvPr id="2" name="Folienbildplatzhalter 1"/>
+          <p:cNvSpPr>
+            <a:spLocks noGrp="1" noRot="1" noChangeAspect="1"/>
+          </p:cNvSpPr>
+          <p:nvPr>
+            <p:ph type="sldImg"/>
+          </p:nvPr>
+        </p:nvSpPr>
+        <p:spPr/>
+      </p:sp>
+      <p:sp>
+        <p:nvSpPr>
+          <p:cNvPr id="3" name="Notizenplatzhalter 2"/>
+          <p:cNvSpPr>
+            <a:spLocks noGrp="1"/>
+          </p:cNvSpPr>
+          <p:nvPr>
+            <p:ph type="body" idx="1"/>
+          </p:nvPr>
+        </p:nvSpPr>
+        <p:spPr/>
+        <p:txBody>
+          <a:bodyPr/>
+          <a:lstStyle/>
+          <a:p>
+            <a:endParaRPr lang="de-DE" dirty="0"/>
+          </a:p>
+        </p:txBody>
+      </p:sp>
+      <p:sp>
+        <p:nvSpPr>
+          <p:cNvPr id="4" name="Foliennummernplatzhalter 3"/>
+          <p:cNvSpPr>
+            <a:spLocks noGrp="1"/>
+          </p:cNvSpPr>
+          <p:nvPr>
+            <p:ph type="sldNum" sz="quarter" idx="10"/>
+          </p:nvPr>
+        </p:nvSpPr>
+        <p:spPr/>
+        <p:txBody>
+          <a:bodyPr/>
+          <a:lstStyle/>
+          <a:p>
+            <a:fld id="{7DE258FE-F2E5-45B1-B077-BAB345233DBE}" type="slidenum">
+              <a:rPr lang="de-CH" smtClean="0"/>
+              <a:t>4</a:t>
+            </a:fld>
+            <a:endParaRPr lang="de-CH"/>
+          </a:p>
+        </p:txBody>
+      </p:sp>
+    </p:spTree>
+    <p:extLst>
+      <p:ext uri="{BB962C8B-B14F-4D97-AF65-F5344CB8AC3E}">
+        <p14:creationId xmlns:p14="http://schemas.microsoft.com/office/powerpoint/2010/main" val="207302004"/>
+      </p:ext>
+    </p:extLst>
+  </p:cSld>
+  <p:clrMapOvr>
+    <a:masterClrMapping/>
+  </p:clrMapOvr>
+</p:notes>
+</file>
+
+<file path=ppt/notesSlides/notesSlide3.xml><?xml version="1.0" encoding="utf-8"?>
+<p:notes xmlns:a="http://schemas.openxmlformats.org/drawingml/2006/main" xmlns:r="http://schemas.openxmlformats.org/officeDocument/2006/relationships" xmlns:p="http://schemas.openxmlformats.org/presentationml/2006/main">
+  <p:cSld>
+    <p:spTree>
+      <p:nvGrpSpPr>
+        <p:cNvPr id="1" name=""/>
+        <p:cNvGrpSpPr/>
+        <p:nvPr/>
+      </p:nvGrpSpPr>
+      <p:grpSpPr>
+        <a:xfrm>
+          <a:off x="0" y="0"/>
+          <a:ext cx="0" cy="0"/>
+          <a:chOff x="0" y="0"/>
+          <a:chExt cx="0" cy="0"/>
+        </a:xfrm>
+      </p:grpSpPr>
+      <p:sp>
+        <p:nvSpPr>
+          <p:cNvPr id="2" name="Folienbildplatzhalter 1"/>
+          <p:cNvSpPr>
+            <a:spLocks noGrp="1" noRot="1" noChangeAspect="1"/>
+          </p:cNvSpPr>
+          <p:nvPr>
+            <p:ph type="sldImg"/>
+          </p:nvPr>
+        </p:nvSpPr>
+        <p:spPr/>
+      </p:sp>
+      <p:sp>
+        <p:nvSpPr>
+          <p:cNvPr id="3" name="Notizenplatzhalter 2"/>
+          <p:cNvSpPr>
+            <a:spLocks noGrp="1"/>
+          </p:cNvSpPr>
+          <p:nvPr>
+            <p:ph type="body" idx="1"/>
+          </p:nvPr>
+        </p:nvSpPr>
+        <p:spPr/>
+        <p:txBody>
+          <a:bodyPr/>
+          <a:lstStyle/>
+          <a:p>
+            <a:endParaRPr lang="de-DE" dirty="0"/>
+          </a:p>
+        </p:txBody>
+      </p:sp>
+      <p:sp>
+        <p:nvSpPr>
+          <p:cNvPr id="4" name="Foliennummernplatzhalter 3"/>
+          <p:cNvSpPr>
+            <a:spLocks noGrp="1"/>
+          </p:cNvSpPr>
+          <p:nvPr>
+            <p:ph type="sldNum" sz="quarter" idx="10"/>
+          </p:nvPr>
+        </p:nvSpPr>
+        <p:spPr/>
+        <p:txBody>
+          <a:bodyPr/>
+          <a:lstStyle/>
+          <a:p>
+            <a:fld id="{7DE258FE-F2E5-45B1-B077-BAB345233DBE}" type="slidenum">
+              <a:rPr lang="de-CH" smtClean="0"/>
+              <a:t>5</a:t>
+            </a:fld>
+            <a:endParaRPr lang="de-CH"/>
+          </a:p>
+        </p:txBody>
+      </p:sp>
+    </p:spTree>
+    <p:extLst>
+      <p:ext uri="{BB962C8B-B14F-4D97-AF65-F5344CB8AC3E}">
+        <p14:creationId xmlns:p14="http://schemas.microsoft.com/office/powerpoint/2010/main" val="3471292866"/>
+      </p:ext>
+    </p:extLst>
+  </p:cSld>
+  <p:clrMapOvr>
+    <a:masterClrMapping/>
+  </p:clrMapOvr>
+</p:notes>
+</file>
+
+<file path=ppt/notesSlides/notesSlide4.xml><?xml version="1.0" encoding="utf-8"?>
+<p:notes xmlns:a="http://schemas.openxmlformats.org/drawingml/2006/main" xmlns:r="http://schemas.openxmlformats.org/officeDocument/2006/relationships" xmlns:p="http://schemas.openxmlformats.org/presentationml/2006/main">
+  <p:cSld>
+    <p:spTree>
+      <p:nvGrpSpPr>
+        <p:cNvPr id="1" name=""/>
+        <p:cNvGrpSpPr/>
+        <p:nvPr/>
+      </p:nvGrpSpPr>
+      <p:grpSpPr>
+        <a:xfrm>
+          <a:off x="0" y="0"/>
+          <a:ext cx="0" cy="0"/>
+          <a:chOff x="0" y="0"/>
+          <a:chExt cx="0" cy="0"/>
+        </a:xfrm>
+      </p:grpSpPr>
+      <p:sp>
+        <p:nvSpPr>
+          <p:cNvPr id="2" name="Folienbildplatzhalter 1"/>
+          <p:cNvSpPr>
+            <a:spLocks noGrp="1" noRot="1" noChangeAspect="1"/>
+          </p:cNvSpPr>
+          <p:nvPr>
+            <p:ph type="sldImg"/>
+          </p:nvPr>
+        </p:nvSpPr>
+        <p:spPr/>
+      </p:sp>
+      <p:sp>
+        <p:nvSpPr>
+          <p:cNvPr id="3" name="Notizenplatzhalter 2"/>
+          <p:cNvSpPr>
+            <a:spLocks noGrp="1"/>
+          </p:cNvSpPr>
+          <p:nvPr>
+            <p:ph type="body" idx="1"/>
+          </p:nvPr>
+        </p:nvSpPr>
+        <p:spPr/>
+        <p:txBody>
+          <a:bodyPr/>
+          <a:lstStyle/>
+          <a:p>
+            <a:endParaRPr lang="de-DE" dirty="0"/>
+          </a:p>
+        </p:txBody>
+      </p:sp>
+      <p:sp>
+        <p:nvSpPr>
+          <p:cNvPr id="4" name="Foliennummernplatzhalter 3"/>
+          <p:cNvSpPr>
+            <a:spLocks noGrp="1"/>
+          </p:cNvSpPr>
+          <p:nvPr>
+            <p:ph type="sldNum" sz="quarter" idx="10"/>
+          </p:nvPr>
+        </p:nvSpPr>
+        <p:spPr/>
+        <p:txBody>
+          <a:bodyPr/>
+          <a:lstStyle/>
+          <a:p>
+            <a:fld id="{7DE258FE-F2E5-45B1-B077-BAB345233DBE}" type="slidenum">
+              <a:rPr lang="de-CH" smtClean="0"/>
+              <a:t>6</a:t>
+            </a:fld>
+            <a:endParaRPr lang="de-CH"/>
+          </a:p>
+        </p:txBody>
+      </p:sp>
+    </p:spTree>
+    <p:extLst>
+      <p:ext uri="{BB962C8B-B14F-4D97-AF65-F5344CB8AC3E}">
+        <p14:creationId xmlns:p14="http://schemas.microsoft.com/office/powerpoint/2010/main" val="757605778"/>
+      </p:ext>
+    </p:extLst>
+  </p:cSld>
+  <p:clrMapOvr>
+    <a:masterClrMapping/>
+  </p:clrMapOvr>
+</p:notes>
+</file>
+
+<file path=ppt/notesSlides/notesSlide5.xml><?xml version="1.0" encoding="utf-8"?>
+<p:notes xmlns:a="http://schemas.openxmlformats.org/drawingml/2006/main" xmlns:r="http://schemas.openxmlformats.org/officeDocument/2006/relationships" xmlns:p="http://schemas.openxmlformats.org/presentationml/2006/main">
+  <p:cSld>
+    <p:spTree>
+      <p:nvGrpSpPr>
+        <p:cNvPr id="1" name=""/>
+        <p:cNvGrpSpPr/>
+        <p:nvPr/>
+      </p:nvGrpSpPr>
+      <p:grpSpPr>
+        <a:xfrm>
+          <a:off x="0" y="0"/>
+          <a:ext cx="0" cy="0"/>
+          <a:chOff x="0" y="0"/>
+          <a:chExt cx="0" cy="0"/>
+        </a:xfrm>
+      </p:grpSpPr>
+      <p:sp>
+        <p:nvSpPr>
+          <p:cNvPr id="2" name="Folienbildplatzhalter 1"/>
+          <p:cNvSpPr>
+            <a:spLocks noGrp="1" noRot="1" noChangeAspect="1"/>
+          </p:cNvSpPr>
+          <p:nvPr>
+            <p:ph type="sldImg"/>
+          </p:nvPr>
+        </p:nvSpPr>
+        <p:spPr/>
+      </p:sp>
+      <p:sp>
+        <p:nvSpPr>
+          <p:cNvPr id="3" name="Notizenplatzhalter 2"/>
+          <p:cNvSpPr>
+            <a:spLocks noGrp="1"/>
+          </p:cNvSpPr>
+          <p:nvPr>
+            <p:ph type="body" idx="1"/>
+          </p:nvPr>
+        </p:nvSpPr>
+        <p:spPr/>
+        <p:txBody>
+          <a:bodyPr/>
+          <a:lstStyle/>
+          <a:p>
+            <a:endParaRPr lang="de-DE" dirty="0"/>
+          </a:p>
+        </p:txBody>
+      </p:sp>
+      <p:sp>
+        <p:nvSpPr>
+          <p:cNvPr id="4" name="Foliennummernplatzhalter 3"/>
+          <p:cNvSpPr>
+            <a:spLocks noGrp="1"/>
+          </p:cNvSpPr>
+          <p:nvPr>
+            <p:ph type="sldNum" sz="quarter" idx="10"/>
+          </p:nvPr>
+        </p:nvSpPr>
+        <p:spPr/>
+        <p:txBody>
+          <a:bodyPr/>
+          <a:lstStyle/>
+          <a:p>
+            <a:fld id="{7DE258FE-F2E5-45B1-B077-BAB345233DBE}" type="slidenum">
+              <a:rPr lang="de-CH" smtClean="0"/>
+              <a:t>7</a:t>
+            </a:fld>
+            <a:endParaRPr lang="de-CH"/>
+          </a:p>
+        </p:txBody>
+      </p:sp>
+    </p:spTree>
+    <p:extLst>
+      <p:ext uri="{BB962C8B-B14F-4D97-AF65-F5344CB8AC3E}">
+        <p14:creationId xmlns:p14="http://schemas.microsoft.com/office/powerpoint/2010/main" val="792059121"/>
+      </p:ext>
+    </p:extLst>
+  </p:cSld>
+  <p:clrMapOvr>
+    <a:masterClrMapping/>
+  </p:clrMapOvr>
+</p:notes>
+</file>
+
+<file path=ppt/notesSlides/notesSlide6.xml><?xml version="1.0" encoding="utf-8"?>
+<p:notes xmlns:a="http://schemas.openxmlformats.org/drawingml/2006/main" xmlns:r="http://schemas.openxmlformats.org/officeDocument/2006/relationships" xmlns:p="http://schemas.openxmlformats.org/presentationml/2006/main">
+  <p:cSld>
+    <p:spTree>
+      <p:nvGrpSpPr>
+        <p:cNvPr id="1" name=""/>
+        <p:cNvGrpSpPr/>
+        <p:nvPr/>
+      </p:nvGrpSpPr>
+      <p:grpSpPr>
+        <a:xfrm>
+          <a:off x="0" y="0"/>
+          <a:ext cx="0" cy="0"/>
+          <a:chOff x="0" y="0"/>
+          <a:chExt cx="0" cy="0"/>
+        </a:xfrm>
+      </p:grpSpPr>
+      <p:sp>
+        <p:nvSpPr>
+          <p:cNvPr id="2" name="Folienbildplatzhalter 1"/>
+          <p:cNvSpPr>
+            <a:spLocks noGrp="1" noRot="1" noChangeAspect="1"/>
+          </p:cNvSpPr>
+          <p:nvPr>
+            <p:ph type="sldImg"/>
+          </p:nvPr>
+        </p:nvSpPr>
+        <p:spPr/>
+      </p:sp>
+      <p:sp>
+        <p:nvSpPr>
+          <p:cNvPr id="3" name="Notizenplatzhalter 2"/>
+          <p:cNvSpPr>
+            <a:spLocks noGrp="1"/>
+          </p:cNvSpPr>
+          <p:nvPr>
+            <p:ph type="body" idx="1"/>
+          </p:nvPr>
+        </p:nvSpPr>
+        <p:spPr/>
+        <p:txBody>
+          <a:bodyPr/>
+          <a:lstStyle/>
+          <a:p>
+            <a:endParaRPr lang="de-DE" dirty="0"/>
+          </a:p>
+        </p:txBody>
+      </p:sp>
+      <p:sp>
+        <p:nvSpPr>
+          <p:cNvPr id="4" name="Foliennummernplatzhalter 3"/>
+          <p:cNvSpPr>
+            <a:spLocks noGrp="1"/>
+          </p:cNvSpPr>
+          <p:nvPr>
+            <p:ph type="sldNum" sz="quarter" idx="10"/>
+          </p:nvPr>
+        </p:nvSpPr>
+        <p:spPr/>
+        <p:txBody>
+          <a:bodyPr/>
+          <a:lstStyle/>
+          <a:p>
+            <a:fld id="{7DE258FE-F2E5-45B1-B077-BAB345233DBE}" type="slidenum">
+              <a:rPr lang="de-CH" smtClean="0"/>
+              <a:t>9</a:t>
+            </a:fld>
+            <a:endParaRPr lang="de-CH"/>
+          </a:p>
+        </p:txBody>
+      </p:sp>
+    </p:spTree>
+    <p:extLst>
+      <p:ext uri="{BB962C8B-B14F-4D97-AF65-F5344CB8AC3E}">
+        <p14:creationId xmlns:p14="http://schemas.microsoft.com/office/powerpoint/2010/main" val="1659631257"/>
+      </p:ext>
+    </p:extLst>
+  </p:cSld>
+  <p:clrMapOvr>
+    <a:masterClrMapping/>
+  </p:clrMapOvr>
+</p:notes>
+</file>
+
+<file path=ppt/notesSlides/notesSlide7.xml><?xml version="1.0" encoding="utf-8"?>
+<p:notes xmlns:a="http://schemas.openxmlformats.org/drawingml/2006/main" xmlns:r="http://schemas.openxmlformats.org/officeDocument/2006/relationships" xmlns:p="http://schemas.openxmlformats.org/presentationml/2006/main">
+  <p:cSld>
+    <p:spTree>
+      <p:nvGrpSpPr>
+        <p:cNvPr id="1" name=""/>
+        <p:cNvGrpSpPr/>
+        <p:nvPr/>
+      </p:nvGrpSpPr>
+      <p:grpSpPr>
+        <a:xfrm>
+          <a:off x="0" y="0"/>
+          <a:ext cx="0" cy="0"/>
+          <a:chOff x="0" y="0"/>
+          <a:chExt cx="0" cy="0"/>
+        </a:xfrm>
+      </p:grpSpPr>
+      <p:sp>
+        <p:nvSpPr>
+          <p:cNvPr id="2" name="Folienbildplatzhalter 1"/>
+          <p:cNvSpPr>
+            <a:spLocks noGrp="1" noRot="1" noChangeAspect="1"/>
+          </p:cNvSpPr>
+          <p:nvPr>
+            <p:ph type="sldImg"/>
+          </p:nvPr>
+        </p:nvSpPr>
+        <p:spPr/>
+      </p:sp>
+      <p:sp>
+        <p:nvSpPr>
+          <p:cNvPr id="3" name="Notizenplatzhalter 2"/>
+          <p:cNvSpPr>
+            <a:spLocks noGrp="1"/>
+          </p:cNvSpPr>
+          <p:nvPr>
+            <p:ph type="body" idx="1"/>
+          </p:nvPr>
+        </p:nvSpPr>
+        <p:spPr/>
+        <p:txBody>
+          <a:bodyPr/>
+          <a:lstStyle/>
+          <a:p>
+            <a:endParaRPr lang="de-DE" dirty="0"/>
+          </a:p>
+        </p:txBody>
+      </p:sp>
+      <p:sp>
+        <p:nvSpPr>
+          <p:cNvPr id="4" name="Foliennummernplatzhalter 3"/>
+          <p:cNvSpPr>
+            <a:spLocks noGrp="1"/>
+          </p:cNvSpPr>
+          <p:nvPr>
+            <p:ph type="sldNum" sz="quarter" idx="10"/>
+          </p:nvPr>
+        </p:nvSpPr>
+        <p:spPr/>
+        <p:txBody>
+          <a:bodyPr/>
+          <a:lstStyle/>
+          <a:p>
+            <a:fld id="{7DE258FE-F2E5-45B1-B077-BAB345233DBE}" type="slidenum">
+              <a:rPr lang="de-CH" smtClean="0"/>
+              <a:t>10</a:t>
+            </a:fld>
+            <a:endParaRPr lang="de-CH"/>
+          </a:p>
+        </p:txBody>
+      </p:sp>
+    </p:spTree>
+    <p:extLst>
+      <p:ext uri="{BB962C8B-B14F-4D97-AF65-F5344CB8AC3E}">
+        <p14:creationId xmlns:p14="http://schemas.microsoft.com/office/powerpoint/2010/main" val="25648446"/>
+      </p:ext>
+    </p:extLst>
+  </p:cSld>
+  <p:clrMapOvr>
+    <a:masterClrMapping/>
+  </p:clrMapOvr>
+</p:notes>
+</file>
+
+<file path=ppt/notesSlides/notesSlide8.xml><?xml version="1.0" encoding="utf-8"?>
+<p:notes xmlns:a="http://schemas.openxmlformats.org/drawingml/2006/main" xmlns:r="http://schemas.openxmlformats.org/officeDocument/2006/relationships" xmlns:p="http://schemas.openxmlformats.org/presentationml/2006/main">
+  <p:cSld>
+    <p:spTree>
+      <p:nvGrpSpPr>
+        <p:cNvPr id="1" name=""/>
+        <p:cNvGrpSpPr/>
+        <p:nvPr/>
+      </p:nvGrpSpPr>
+      <p:grpSpPr>
+        <a:xfrm>
+          <a:off x="0" y="0"/>
+          <a:ext cx="0" cy="0"/>
+          <a:chOff x="0" y="0"/>
+          <a:chExt cx="0" cy="0"/>
+        </a:xfrm>
+      </p:grpSpPr>
+      <p:sp>
+        <p:nvSpPr>
+          <p:cNvPr id="2" name="Folienbildplatzhalter 1"/>
+          <p:cNvSpPr>
+            <a:spLocks noGrp="1" noRot="1" noChangeAspect="1"/>
+          </p:cNvSpPr>
+          <p:nvPr>
+            <p:ph type="sldImg"/>
+          </p:nvPr>
+        </p:nvSpPr>
+        <p:spPr/>
+      </p:sp>
+      <p:sp>
+        <p:nvSpPr>
+          <p:cNvPr id="3" name="Notizenplatzhalter 2"/>
+          <p:cNvSpPr>
+            <a:spLocks noGrp="1"/>
+          </p:cNvSpPr>
+          <p:nvPr>
+            <p:ph type="body" idx="1"/>
+          </p:nvPr>
+        </p:nvSpPr>
+        <p:spPr/>
+        <p:txBody>
+          <a:bodyPr/>
+          <a:lstStyle/>
+          <a:p>
+            <a:endParaRPr lang="de-DE" dirty="0"/>
+          </a:p>
+        </p:txBody>
+      </p:sp>
+      <p:sp>
+        <p:nvSpPr>
+          <p:cNvPr id="4" name="Foliennummernplatzhalter 3"/>
+          <p:cNvSpPr>
+            <a:spLocks noGrp="1"/>
+          </p:cNvSpPr>
+          <p:nvPr>
+            <p:ph type="sldNum" sz="quarter" idx="10"/>
+          </p:nvPr>
+        </p:nvSpPr>
+        <p:spPr/>
+        <p:txBody>
+          <a:bodyPr/>
+          <a:lstStyle/>
+          <a:p>
+            <a:fld id="{7DE258FE-F2E5-45B1-B077-BAB345233DBE}" type="slidenum">
+              <a:rPr lang="de-CH" smtClean="0"/>
+              <a:t>11</a:t>
+            </a:fld>
+            <a:endParaRPr lang="de-CH"/>
+          </a:p>
+        </p:txBody>
+      </p:sp>
+    </p:spTree>
+    <p:extLst>
+      <p:ext uri="{BB962C8B-B14F-4D97-AF65-F5344CB8AC3E}">
+        <p14:creationId xmlns:p14="http://schemas.microsoft.com/office/powerpoint/2010/main" val="1130555357"/>
+      </p:ext>
+    </p:extLst>
+  </p:cSld>
+  <p:clrMapOvr>
+    <a:masterClrMapping/>
+  </p:clrMapOvr>
+</p:notes>
+</file>
+
 <file path=ppt/slideLayouts/slideLayout1.xml><?xml version="1.0" encoding="utf-8"?>
 <p:sldLayout xmlns:a="http://schemas.openxmlformats.org/drawingml/2006/main" xmlns:r="http://schemas.openxmlformats.org/officeDocument/2006/relationships" xmlns:p="http://schemas.openxmlformats.org/presentationml/2006/main" type="title" preserve="1">
   <p:cSld name="Titelfolie">
@@ -694,7 +1290,7 @@
           <a:p>
             <a:fld id="{20FD5246-4265-435A-B901-A38BFD400D8A}" type="datetimeFigureOut">
               <a:rPr lang="de-CH" smtClean="0"/>
-              <a:t>20.03.18</a:t>
+              <a:t>29.03.2018</a:t>
             </a:fld>
             <a:endParaRPr lang="de-CH"/>
           </a:p>
@@ -864,7 +1460,7 @@
           <a:p>
             <a:fld id="{20FD5246-4265-435A-B901-A38BFD400D8A}" type="datetimeFigureOut">
               <a:rPr lang="de-CH" smtClean="0"/>
-              <a:t>20.03.18</a:t>
+              <a:t>29.03.2018</a:t>
             </a:fld>
             <a:endParaRPr lang="de-CH"/>
           </a:p>
@@ -1044,7 +1640,7 @@
           <a:p>
             <a:fld id="{20FD5246-4265-435A-B901-A38BFD400D8A}" type="datetimeFigureOut">
               <a:rPr lang="de-CH" smtClean="0"/>
-              <a:t>20.03.18</a:t>
+              <a:t>29.03.2018</a:t>
             </a:fld>
             <a:endParaRPr lang="de-CH"/>
           </a:p>
@@ -1214,7 +1810,7 @@
           <a:p>
             <a:fld id="{20FD5246-4265-435A-B901-A38BFD400D8A}" type="datetimeFigureOut">
               <a:rPr lang="de-CH" smtClean="0"/>
-              <a:t>20.03.18</a:t>
+              <a:t>29.03.2018</a:t>
             </a:fld>
             <a:endParaRPr lang="de-CH"/>
           </a:p>
@@ -1458,7 +2054,7 @@
           <a:p>
             <a:fld id="{20FD5246-4265-435A-B901-A38BFD400D8A}" type="datetimeFigureOut">
               <a:rPr lang="de-CH" smtClean="0"/>
-              <a:t>20.03.18</a:t>
+              <a:t>29.03.2018</a:t>
             </a:fld>
             <a:endParaRPr lang="de-CH"/>
           </a:p>
@@ -1690,7 +2286,7 @@
           <a:p>
             <a:fld id="{20FD5246-4265-435A-B901-A38BFD400D8A}" type="datetimeFigureOut">
               <a:rPr lang="de-CH" smtClean="0"/>
-              <a:t>20.03.18</a:t>
+              <a:t>29.03.2018</a:t>
             </a:fld>
             <a:endParaRPr lang="de-CH"/>
           </a:p>
@@ -2057,7 +2653,7 @@
           <a:p>
             <a:fld id="{20FD5246-4265-435A-B901-A38BFD400D8A}" type="datetimeFigureOut">
               <a:rPr lang="de-CH" smtClean="0"/>
-              <a:t>20.03.18</a:t>
+              <a:t>29.03.2018</a:t>
             </a:fld>
             <a:endParaRPr lang="de-CH"/>
           </a:p>
@@ -2175,7 +2771,7 @@
           <a:p>
             <a:fld id="{20FD5246-4265-435A-B901-A38BFD400D8A}" type="datetimeFigureOut">
               <a:rPr lang="de-CH" smtClean="0"/>
-              <a:t>20.03.18</a:t>
+              <a:t>29.03.2018</a:t>
             </a:fld>
             <a:endParaRPr lang="de-CH"/>
           </a:p>
@@ -2270,7 +2866,7 @@
           <a:p>
             <a:fld id="{20FD5246-4265-435A-B901-A38BFD400D8A}" type="datetimeFigureOut">
               <a:rPr lang="de-CH" smtClean="0"/>
-              <a:t>20.03.18</a:t>
+              <a:t>29.03.2018</a:t>
             </a:fld>
             <a:endParaRPr lang="de-CH"/>
           </a:p>
@@ -2547,7 +3143,7 @@
           <a:p>
             <a:fld id="{20FD5246-4265-435A-B901-A38BFD400D8A}" type="datetimeFigureOut">
               <a:rPr lang="de-CH" smtClean="0"/>
-              <a:t>20.03.18</a:t>
+              <a:t>29.03.2018</a:t>
             </a:fld>
             <a:endParaRPr lang="de-CH"/>
           </a:p>
@@ -2804,7 +3400,7 @@
           <a:p>
             <a:fld id="{20FD5246-4265-435A-B901-A38BFD400D8A}" type="datetimeFigureOut">
               <a:rPr lang="de-CH" smtClean="0"/>
-              <a:t>20.03.18</a:t>
+              <a:t>29.03.2018</a:t>
             </a:fld>
             <a:endParaRPr lang="de-CH"/>
           </a:p>
@@ -3017,7 +3613,7 @@
           <a:p>
             <a:fld id="{20FD5246-4265-435A-B901-A38BFD400D8A}" type="datetimeFigureOut">
               <a:rPr lang="de-CH" smtClean="0"/>
-              <a:t>20.03.18</a:t>
+              <a:t>29.03.2018</a:t>
             </a:fld>
             <a:endParaRPr lang="de-CH"/>
           </a:p>
@@ -3710,6 +4306,1053 @@
     <p:extLst>
       <p:ext uri="{BB962C8B-B14F-4D97-AF65-F5344CB8AC3E}">
         <p14:creationId xmlns:p14="http://schemas.microsoft.com/office/powerpoint/2010/main" val="2816446538"/>
+      </p:ext>
+    </p:extLst>
+  </p:cSld>
+  <p:clrMapOvr>
+    <a:masterClrMapping/>
+  </p:clrMapOvr>
+</p:sld>
+</file>
+
+<file path=ppt/slides/slide10.xml><?xml version="1.0" encoding="utf-8"?>
+<p:sld xmlns:a="http://schemas.openxmlformats.org/drawingml/2006/main" xmlns:r="http://schemas.openxmlformats.org/officeDocument/2006/relationships" xmlns:p="http://schemas.openxmlformats.org/presentationml/2006/main">
+  <p:cSld>
+    <p:spTree>
+      <p:nvGrpSpPr>
+        <p:cNvPr id="1" name=""/>
+        <p:cNvGrpSpPr/>
+        <p:nvPr/>
+      </p:nvGrpSpPr>
+      <p:grpSpPr>
+        <a:xfrm>
+          <a:off x="0" y="0"/>
+          <a:ext cx="0" cy="0"/>
+          <a:chOff x="0" y="0"/>
+          <a:chExt cx="0" cy="0"/>
+        </a:xfrm>
+      </p:grpSpPr>
+      <p:pic>
+        <p:nvPicPr>
+          <p:cNvPr id="12" name="Grafik 11">
+            <a:extLst>
+              <a:ext uri="{FF2B5EF4-FFF2-40B4-BE49-F238E27FC236}">
+                <a16:creationId xmlns:a16="http://schemas.microsoft.com/office/drawing/2014/main" id="{63518878-B2F8-9E42-B6D4-7C199E65E901}"/>
+              </a:ext>
+            </a:extLst>
+          </p:cNvPr>
+          <p:cNvPicPr>
+            <a:picLocks noChangeAspect="1"/>
+          </p:cNvPicPr>
+          <p:nvPr/>
+        </p:nvPicPr>
+        <p:blipFill>
+          <a:blip r:embed="rId3">
+            <a:extLst>
+              <a:ext uri="{28A0092B-C50C-407E-A947-70E740481C1C}">
+                <a14:useLocalDpi xmlns:a14="http://schemas.microsoft.com/office/drawing/2010/main" val="0"/>
+              </a:ext>
+            </a:extLst>
+          </a:blip>
+          <a:stretch>
+            <a:fillRect/>
+          </a:stretch>
+        </p:blipFill>
+        <p:spPr>
+          <a:xfrm>
+            <a:off x="0" y="-3571"/>
+            <a:ext cx="1066800" cy="406400"/>
+          </a:xfrm>
+          <a:prstGeom prst="rect">
+            <a:avLst/>
+          </a:prstGeom>
+        </p:spPr>
+      </p:pic>
+      <p:cxnSp>
+        <p:nvCxnSpPr>
+          <p:cNvPr id="5" name="Gerade Verbindung 4"/>
+          <p:cNvCxnSpPr/>
+          <p:nvPr/>
+        </p:nvCxnSpPr>
+        <p:spPr>
+          <a:xfrm>
+            <a:off x="0" y="6525344"/>
+            <a:ext cx="9144000" cy="0"/>
+          </a:xfrm>
+          <a:prstGeom prst="line">
+            <a:avLst/>
+          </a:prstGeom>
+          <a:ln>
+            <a:solidFill>
+              <a:schemeClr val="tx1"/>
+            </a:solidFill>
+          </a:ln>
+        </p:spPr>
+        <p:style>
+          <a:lnRef idx="1">
+            <a:schemeClr val="accent1"/>
+          </a:lnRef>
+          <a:fillRef idx="0">
+            <a:schemeClr val="accent1"/>
+          </a:fillRef>
+          <a:effectRef idx="0">
+            <a:schemeClr val="accent1"/>
+          </a:effectRef>
+          <a:fontRef idx="minor">
+            <a:schemeClr val="tx1"/>
+          </a:fontRef>
+        </p:style>
+      </p:cxnSp>
+      <p:sp>
+        <p:nvSpPr>
+          <p:cNvPr id="6" name="Textfeld 5"/>
+          <p:cNvSpPr txBox="1"/>
+          <p:nvPr/>
+        </p:nvSpPr>
+        <p:spPr>
+          <a:xfrm>
+            <a:off x="287830" y="6542726"/>
+            <a:ext cx="1208792" cy="276999"/>
+          </a:xfrm>
+          <a:prstGeom prst="rect">
+            <a:avLst/>
+          </a:prstGeom>
+          <a:noFill/>
+        </p:spPr>
+        <p:txBody>
+          <a:bodyPr wrap="none" rtlCol="0">
+            <a:spAutoFit/>
+          </a:bodyPr>
+          <a:lstStyle/>
+          <a:p>
+            <a:r>
+              <a:rPr lang="de-CH" sz="1200" dirty="0">
+                <a:latin typeface="Calibri" panose="020F0502020204030204" pitchFamily="34" charset="0"/>
+              </a:rPr>
+              <a:t>Meilenstein_M2</a:t>
+            </a:r>
+          </a:p>
+        </p:txBody>
+      </p:sp>
+      <p:sp>
+        <p:nvSpPr>
+          <p:cNvPr id="8" name="Textfeld 7"/>
+          <p:cNvSpPr txBox="1"/>
+          <p:nvPr/>
+        </p:nvSpPr>
+        <p:spPr>
+          <a:xfrm>
+            <a:off x="3627204" y="6542724"/>
+            <a:ext cx="1800200" cy="276999"/>
+          </a:xfrm>
+          <a:prstGeom prst="rect">
+            <a:avLst/>
+          </a:prstGeom>
+          <a:noFill/>
+        </p:spPr>
+        <p:txBody>
+          <a:bodyPr wrap="square" rtlCol="0">
+            <a:spAutoFit/>
+          </a:bodyPr>
+          <a:lstStyle/>
+          <a:p>
+            <a:pPr algn="ctr"/>
+            <a:r>
+              <a:rPr lang="de-CH" sz="1200" dirty="0">
+                <a:latin typeface="Calibri" panose="020F0502020204030204" pitchFamily="34" charset="0"/>
+              </a:rPr>
+              <a:t>Seite 2/??</a:t>
+            </a:r>
+          </a:p>
+        </p:txBody>
+      </p:sp>
+      <p:cxnSp>
+        <p:nvCxnSpPr>
+          <p:cNvPr id="9" name="Gerade Verbindung 4"/>
+          <p:cNvCxnSpPr/>
+          <p:nvPr/>
+        </p:nvCxnSpPr>
+        <p:spPr>
+          <a:xfrm>
+            <a:off x="-5050" y="421597"/>
+            <a:ext cx="9144000" cy="0"/>
+          </a:xfrm>
+          <a:prstGeom prst="line">
+            <a:avLst/>
+          </a:prstGeom>
+          <a:ln>
+            <a:solidFill>
+              <a:schemeClr val="tx1"/>
+            </a:solidFill>
+          </a:ln>
+        </p:spPr>
+        <p:style>
+          <a:lnRef idx="1">
+            <a:schemeClr val="accent1"/>
+          </a:lnRef>
+          <a:fillRef idx="0">
+            <a:schemeClr val="accent1"/>
+          </a:fillRef>
+          <a:effectRef idx="0">
+            <a:schemeClr val="accent1"/>
+          </a:effectRef>
+          <a:fontRef idx="minor">
+            <a:schemeClr val="tx1"/>
+          </a:fontRef>
+        </p:style>
+      </p:cxnSp>
+      <p:sp>
+        <p:nvSpPr>
+          <p:cNvPr id="10" name="Textfeld 9"/>
+          <p:cNvSpPr txBox="1"/>
+          <p:nvPr/>
+        </p:nvSpPr>
+        <p:spPr>
+          <a:xfrm>
+            <a:off x="7615828" y="144598"/>
+            <a:ext cx="1265796" cy="276999"/>
+          </a:xfrm>
+          <a:prstGeom prst="rect">
+            <a:avLst/>
+          </a:prstGeom>
+          <a:noFill/>
+        </p:spPr>
+        <p:txBody>
+          <a:bodyPr wrap="none" rtlCol="0">
+            <a:spAutoFit/>
+          </a:bodyPr>
+          <a:lstStyle/>
+          <a:p>
+            <a:pPr algn="r"/>
+            <a:r>
+              <a:rPr lang="de-CH" sz="1200" dirty="0">
+                <a:latin typeface="Calibri" panose="020F0502020204030204" pitchFamily="34" charset="0"/>
+              </a:rPr>
+              <a:t>SysP18_Team_10</a:t>
+            </a:r>
+          </a:p>
+        </p:txBody>
+      </p:sp>
+      <p:sp>
+        <p:nvSpPr>
+          <p:cNvPr id="14" name="Textfeld 13"/>
+          <p:cNvSpPr txBox="1"/>
+          <p:nvPr/>
+        </p:nvSpPr>
+        <p:spPr>
+          <a:xfrm>
+            <a:off x="398834" y="436987"/>
+            <a:ext cx="4176464" cy="523220"/>
+          </a:xfrm>
+          <a:prstGeom prst="rect">
+            <a:avLst/>
+          </a:prstGeom>
+          <a:noFill/>
+        </p:spPr>
+        <p:txBody>
+          <a:bodyPr wrap="square" rtlCol="0">
+            <a:spAutoFit/>
+          </a:bodyPr>
+          <a:lstStyle/>
+          <a:p>
+            <a:r>
+              <a:rPr lang="de-CH" sz="2800" b="1" dirty="0">
+                <a:latin typeface="+mj-lt"/>
+              </a:rPr>
+              <a:t>Motorentreiber PCB Layout</a:t>
+            </a:r>
+          </a:p>
+        </p:txBody>
+      </p:sp>
+      <p:sp>
+        <p:nvSpPr>
+          <p:cNvPr id="16" name="Textfeld 15">
+            <a:extLst>
+              <a:ext uri="{FF2B5EF4-FFF2-40B4-BE49-F238E27FC236}">
+                <a16:creationId xmlns:a16="http://schemas.microsoft.com/office/drawing/2014/main" id="{2EBD323C-4D9D-5D42-9645-414FFBB7D04B}"/>
+              </a:ext>
+            </a:extLst>
+          </p:cNvPr>
+          <p:cNvSpPr txBox="1"/>
+          <p:nvPr/>
+        </p:nvSpPr>
+        <p:spPr>
+          <a:xfrm>
+            <a:off x="7840953" y="6542725"/>
+            <a:ext cx="1040671" cy="276999"/>
+          </a:xfrm>
+          <a:prstGeom prst="rect">
+            <a:avLst/>
+          </a:prstGeom>
+          <a:noFill/>
+        </p:spPr>
+        <p:txBody>
+          <a:bodyPr wrap="none" rtlCol="0">
+            <a:spAutoFit/>
+          </a:bodyPr>
+          <a:lstStyle/>
+          <a:p>
+            <a:pPr algn="r"/>
+            <a:r>
+              <a:rPr lang="de-CH" sz="1200" dirty="0">
+                <a:latin typeface="Calibri" panose="020F0502020204030204" pitchFamily="34" charset="0"/>
+              </a:rPr>
+              <a:t>3.  März 2018</a:t>
+            </a:r>
+          </a:p>
+        </p:txBody>
+      </p:sp>
+      <p:pic>
+        <p:nvPicPr>
+          <p:cNvPr id="4" name="Grafik 3">
+            <a:extLst>
+              <a:ext uri="{FF2B5EF4-FFF2-40B4-BE49-F238E27FC236}">
+                <a16:creationId xmlns:a16="http://schemas.microsoft.com/office/drawing/2014/main" id="{2ADF5744-C040-4AEC-B1FA-8FF6E4528092}"/>
+              </a:ext>
+            </a:extLst>
+          </p:cNvPr>
+          <p:cNvPicPr>
+            <a:picLocks noChangeAspect="1"/>
+          </p:cNvPicPr>
+          <p:nvPr/>
+        </p:nvPicPr>
+        <p:blipFill rotWithShape="1">
+          <a:blip r:embed="rId4">
+            <a:extLst>
+              <a:ext uri="{28A0092B-C50C-407E-A947-70E740481C1C}">
+                <a14:useLocalDpi xmlns:a14="http://schemas.microsoft.com/office/drawing/2010/main" val="0"/>
+              </a:ext>
+            </a:extLst>
+          </a:blip>
+          <a:srcRect l="770" t="-397" r="772" b="1"/>
+          <a:stretch/>
+        </p:blipFill>
+        <p:spPr>
+          <a:xfrm>
+            <a:off x="1504255" y="960207"/>
+            <a:ext cx="6142086" cy="5302186"/>
+          </a:xfrm>
+          <a:prstGeom prst="rect">
+            <a:avLst/>
+          </a:prstGeom>
+        </p:spPr>
+      </p:pic>
+    </p:spTree>
+    <p:extLst>
+      <p:ext uri="{BB962C8B-B14F-4D97-AF65-F5344CB8AC3E}">
+        <p14:creationId xmlns:p14="http://schemas.microsoft.com/office/powerpoint/2010/main" val="2489567348"/>
+      </p:ext>
+    </p:extLst>
+  </p:cSld>
+  <p:clrMapOvr>
+    <a:masterClrMapping/>
+  </p:clrMapOvr>
+</p:sld>
+</file>
+
+<file path=ppt/slides/slide11.xml><?xml version="1.0" encoding="utf-8"?>
+<p:sld xmlns:a="http://schemas.openxmlformats.org/drawingml/2006/main" xmlns:r="http://schemas.openxmlformats.org/officeDocument/2006/relationships" xmlns:p="http://schemas.openxmlformats.org/presentationml/2006/main">
+  <p:cSld>
+    <p:spTree>
+      <p:nvGrpSpPr>
+        <p:cNvPr id="1" name=""/>
+        <p:cNvGrpSpPr/>
+        <p:nvPr/>
+      </p:nvGrpSpPr>
+      <p:grpSpPr>
+        <a:xfrm>
+          <a:off x="0" y="0"/>
+          <a:ext cx="0" cy="0"/>
+          <a:chOff x="0" y="0"/>
+          <a:chExt cx="0" cy="0"/>
+        </a:xfrm>
+      </p:grpSpPr>
+      <p:pic>
+        <p:nvPicPr>
+          <p:cNvPr id="12" name="Grafik 11">
+            <a:extLst>
+              <a:ext uri="{FF2B5EF4-FFF2-40B4-BE49-F238E27FC236}">
+                <a16:creationId xmlns:a16="http://schemas.microsoft.com/office/drawing/2014/main" id="{63518878-B2F8-9E42-B6D4-7C199E65E901}"/>
+              </a:ext>
+            </a:extLst>
+          </p:cNvPr>
+          <p:cNvPicPr>
+            <a:picLocks noChangeAspect="1"/>
+          </p:cNvPicPr>
+          <p:nvPr/>
+        </p:nvPicPr>
+        <p:blipFill>
+          <a:blip r:embed="rId3">
+            <a:extLst>
+              <a:ext uri="{28A0092B-C50C-407E-A947-70E740481C1C}">
+                <a14:useLocalDpi xmlns:a14="http://schemas.microsoft.com/office/drawing/2010/main" val="0"/>
+              </a:ext>
+            </a:extLst>
+          </a:blip>
+          <a:stretch>
+            <a:fillRect/>
+          </a:stretch>
+        </p:blipFill>
+        <p:spPr>
+          <a:xfrm>
+            <a:off x="0" y="-3571"/>
+            <a:ext cx="1066800" cy="406400"/>
+          </a:xfrm>
+          <a:prstGeom prst="rect">
+            <a:avLst/>
+          </a:prstGeom>
+        </p:spPr>
+      </p:pic>
+      <p:cxnSp>
+        <p:nvCxnSpPr>
+          <p:cNvPr id="5" name="Gerade Verbindung 4"/>
+          <p:cNvCxnSpPr/>
+          <p:nvPr/>
+        </p:nvCxnSpPr>
+        <p:spPr>
+          <a:xfrm>
+            <a:off x="0" y="6525344"/>
+            <a:ext cx="9144000" cy="0"/>
+          </a:xfrm>
+          <a:prstGeom prst="line">
+            <a:avLst/>
+          </a:prstGeom>
+          <a:ln>
+            <a:solidFill>
+              <a:schemeClr val="tx1"/>
+            </a:solidFill>
+          </a:ln>
+        </p:spPr>
+        <p:style>
+          <a:lnRef idx="1">
+            <a:schemeClr val="accent1"/>
+          </a:lnRef>
+          <a:fillRef idx="0">
+            <a:schemeClr val="accent1"/>
+          </a:fillRef>
+          <a:effectRef idx="0">
+            <a:schemeClr val="accent1"/>
+          </a:effectRef>
+          <a:fontRef idx="minor">
+            <a:schemeClr val="tx1"/>
+          </a:fontRef>
+        </p:style>
+      </p:cxnSp>
+      <p:sp>
+        <p:nvSpPr>
+          <p:cNvPr id="6" name="Textfeld 5"/>
+          <p:cNvSpPr txBox="1"/>
+          <p:nvPr/>
+        </p:nvSpPr>
+        <p:spPr>
+          <a:xfrm>
+            <a:off x="287830" y="6542726"/>
+            <a:ext cx="1208792" cy="276999"/>
+          </a:xfrm>
+          <a:prstGeom prst="rect">
+            <a:avLst/>
+          </a:prstGeom>
+          <a:noFill/>
+        </p:spPr>
+        <p:txBody>
+          <a:bodyPr wrap="none" rtlCol="0">
+            <a:spAutoFit/>
+          </a:bodyPr>
+          <a:lstStyle/>
+          <a:p>
+            <a:r>
+              <a:rPr lang="de-CH" sz="1200" dirty="0">
+                <a:latin typeface="Calibri" panose="020F0502020204030204" pitchFamily="34" charset="0"/>
+              </a:rPr>
+              <a:t>Meilenstein_M2</a:t>
+            </a:r>
+          </a:p>
+        </p:txBody>
+      </p:sp>
+      <p:sp>
+        <p:nvSpPr>
+          <p:cNvPr id="8" name="Textfeld 7"/>
+          <p:cNvSpPr txBox="1"/>
+          <p:nvPr/>
+        </p:nvSpPr>
+        <p:spPr>
+          <a:xfrm>
+            <a:off x="3627204" y="6542724"/>
+            <a:ext cx="1800200" cy="276999"/>
+          </a:xfrm>
+          <a:prstGeom prst="rect">
+            <a:avLst/>
+          </a:prstGeom>
+          <a:noFill/>
+        </p:spPr>
+        <p:txBody>
+          <a:bodyPr wrap="square" rtlCol="0">
+            <a:spAutoFit/>
+          </a:bodyPr>
+          <a:lstStyle/>
+          <a:p>
+            <a:pPr algn="ctr"/>
+            <a:r>
+              <a:rPr lang="de-CH" sz="1200" dirty="0">
+                <a:latin typeface="Calibri" panose="020F0502020204030204" pitchFamily="34" charset="0"/>
+              </a:rPr>
+              <a:t>Seite 2/??</a:t>
+            </a:r>
+          </a:p>
+        </p:txBody>
+      </p:sp>
+      <p:cxnSp>
+        <p:nvCxnSpPr>
+          <p:cNvPr id="9" name="Gerade Verbindung 4"/>
+          <p:cNvCxnSpPr/>
+          <p:nvPr/>
+        </p:nvCxnSpPr>
+        <p:spPr>
+          <a:xfrm>
+            <a:off x="-5050" y="421597"/>
+            <a:ext cx="9144000" cy="0"/>
+          </a:xfrm>
+          <a:prstGeom prst="line">
+            <a:avLst/>
+          </a:prstGeom>
+          <a:ln>
+            <a:solidFill>
+              <a:schemeClr val="tx1"/>
+            </a:solidFill>
+          </a:ln>
+        </p:spPr>
+        <p:style>
+          <a:lnRef idx="1">
+            <a:schemeClr val="accent1"/>
+          </a:lnRef>
+          <a:fillRef idx="0">
+            <a:schemeClr val="accent1"/>
+          </a:fillRef>
+          <a:effectRef idx="0">
+            <a:schemeClr val="accent1"/>
+          </a:effectRef>
+          <a:fontRef idx="minor">
+            <a:schemeClr val="tx1"/>
+          </a:fontRef>
+        </p:style>
+      </p:cxnSp>
+      <p:sp>
+        <p:nvSpPr>
+          <p:cNvPr id="10" name="Textfeld 9"/>
+          <p:cNvSpPr txBox="1"/>
+          <p:nvPr/>
+        </p:nvSpPr>
+        <p:spPr>
+          <a:xfrm>
+            <a:off x="7615828" y="144598"/>
+            <a:ext cx="1265796" cy="276999"/>
+          </a:xfrm>
+          <a:prstGeom prst="rect">
+            <a:avLst/>
+          </a:prstGeom>
+          <a:noFill/>
+        </p:spPr>
+        <p:txBody>
+          <a:bodyPr wrap="none" rtlCol="0">
+            <a:spAutoFit/>
+          </a:bodyPr>
+          <a:lstStyle/>
+          <a:p>
+            <a:pPr algn="r"/>
+            <a:r>
+              <a:rPr lang="de-CH" sz="1200" dirty="0">
+                <a:latin typeface="Calibri" panose="020F0502020204030204" pitchFamily="34" charset="0"/>
+              </a:rPr>
+              <a:t>SysP18_Team_10</a:t>
+            </a:r>
+          </a:p>
+        </p:txBody>
+      </p:sp>
+      <p:sp>
+        <p:nvSpPr>
+          <p:cNvPr id="14" name="Textfeld 13"/>
+          <p:cNvSpPr txBox="1"/>
+          <p:nvPr/>
+        </p:nvSpPr>
+        <p:spPr>
+          <a:xfrm>
+            <a:off x="467544" y="461248"/>
+            <a:ext cx="7560840" cy="523220"/>
+          </a:xfrm>
+          <a:prstGeom prst="rect">
+            <a:avLst/>
+          </a:prstGeom>
+          <a:noFill/>
+        </p:spPr>
+        <p:txBody>
+          <a:bodyPr wrap="square" rtlCol="0">
+            <a:spAutoFit/>
+          </a:bodyPr>
+          <a:lstStyle/>
+          <a:p>
+            <a:r>
+              <a:rPr lang="de-CH" sz="2800" b="1" dirty="0">
+                <a:latin typeface="+mj-lt"/>
+              </a:rPr>
+              <a:t>Fehlerquelle Spannungsversorgung (Switch-Loop)</a:t>
+            </a:r>
+          </a:p>
+        </p:txBody>
+      </p:sp>
+      <p:sp>
+        <p:nvSpPr>
+          <p:cNvPr id="16" name="Textfeld 15">
+            <a:extLst>
+              <a:ext uri="{FF2B5EF4-FFF2-40B4-BE49-F238E27FC236}">
+                <a16:creationId xmlns:a16="http://schemas.microsoft.com/office/drawing/2014/main" id="{2EBD323C-4D9D-5D42-9645-414FFBB7D04B}"/>
+              </a:ext>
+            </a:extLst>
+          </p:cNvPr>
+          <p:cNvSpPr txBox="1"/>
+          <p:nvPr/>
+        </p:nvSpPr>
+        <p:spPr>
+          <a:xfrm>
+            <a:off x="7840953" y="6542725"/>
+            <a:ext cx="1040671" cy="276999"/>
+          </a:xfrm>
+          <a:prstGeom prst="rect">
+            <a:avLst/>
+          </a:prstGeom>
+          <a:noFill/>
+        </p:spPr>
+        <p:txBody>
+          <a:bodyPr wrap="none" rtlCol="0">
+            <a:spAutoFit/>
+          </a:bodyPr>
+          <a:lstStyle/>
+          <a:p>
+            <a:pPr algn="r"/>
+            <a:r>
+              <a:rPr lang="de-CH" sz="1200" dirty="0">
+                <a:latin typeface="Calibri" panose="020F0502020204030204" pitchFamily="34" charset="0"/>
+              </a:rPr>
+              <a:t>3.  März 2018</a:t>
+            </a:r>
+          </a:p>
+        </p:txBody>
+      </p:sp>
+      <p:pic>
+        <p:nvPicPr>
+          <p:cNvPr id="3" name="Grafik 2">
+            <a:extLst>
+              <a:ext uri="{FF2B5EF4-FFF2-40B4-BE49-F238E27FC236}">
+                <a16:creationId xmlns:a16="http://schemas.microsoft.com/office/drawing/2014/main" id="{8531EF22-365A-4750-B895-14BEE60430CC}"/>
+              </a:ext>
+            </a:extLst>
+          </p:cNvPr>
+          <p:cNvPicPr>
+            <a:picLocks noChangeAspect="1"/>
+          </p:cNvPicPr>
+          <p:nvPr/>
+        </p:nvPicPr>
+        <p:blipFill>
+          <a:blip r:embed="rId4">
+            <a:extLst>
+              <a:ext uri="{28A0092B-C50C-407E-A947-70E740481C1C}">
+                <a14:useLocalDpi xmlns:a14="http://schemas.microsoft.com/office/drawing/2010/main" val="0"/>
+              </a:ext>
+            </a:extLst>
+          </a:blip>
+          <a:stretch>
+            <a:fillRect/>
+          </a:stretch>
+        </p:blipFill>
+        <p:spPr>
+          <a:xfrm>
+            <a:off x="2699792" y="980524"/>
+            <a:ext cx="3744416" cy="5279393"/>
+          </a:xfrm>
+          <a:prstGeom prst="rect">
+            <a:avLst/>
+          </a:prstGeom>
+        </p:spPr>
+      </p:pic>
+    </p:spTree>
+    <p:extLst>
+      <p:ext uri="{BB962C8B-B14F-4D97-AF65-F5344CB8AC3E}">
+        <p14:creationId xmlns:p14="http://schemas.microsoft.com/office/powerpoint/2010/main" val="1802391204"/>
+      </p:ext>
+    </p:extLst>
+  </p:cSld>
+  <p:clrMapOvr>
+    <a:masterClrMapping/>
+  </p:clrMapOvr>
+</p:sld>
+</file>
+
+<file path=ppt/slides/slide12.xml><?xml version="1.0" encoding="utf-8"?>
+<p:sld xmlns:a="http://schemas.openxmlformats.org/drawingml/2006/main" xmlns:r="http://schemas.openxmlformats.org/officeDocument/2006/relationships" xmlns:p="http://schemas.openxmlformats.org/presentationml/2006/main">
+  <p:cSld>
+    <p:spTree>
+      <p:nvGrpSpPr>
+        <p:cNvPr id="1" name=""/>
+        <p:cNvGrpSpPr/>
+        <p:nvPr/>
+      </p:nvGrpSpPr>
+      <p:grpSpPr>
+        <a:xfrm>
+          <a:off x="0" y="0"/>
+          <a:ext cx="0" cy="0"/>
+          <a:chOff x="0" y="0"/>
+          <a:chExt cx="0" cy="0"/>
+        </a:xfrm>
+      </p:grpSpPr>
+      <p:pic>
+        <p:nvPicPr>
+          <p:cNvPr id="13" name="Grafik 12">
+            <a:extLst>
+              <a:ext uri="{FF2B5EF4-FFF2-40B4-BE49-F238E27FC236}">
+                <a16:creationId xmlns:a16="http://schemas.microsoft.com/office/drawing/2014/main" id="{00453448-D0BE-BC4A-91C8-50E637D2FFD5}"/>
+              </a:ext>
+            </a:extLst>
+          </p:cNvPr>
+          <p:cNvPicPr>
+            <a:picLocks noChangeAspect="1"/>
+          </p:cNvPicPr>
+          <p:nvPr/>
+        </p:nvPicPr>
+        <p:blipFill>
+          <a:blip r:embed="rId2">
+            <a:extLst>
+              <a:ext uri="{28A0092B-C50C-407E-A947-70E740481C1C}">
+                <a14:useLocalDpi xmlns:a14="http://schemas.microsoft.com/office/drawing/2010/main" val="0"/>
+              </a:ext>
+            </a:extLst>
+          </a:blip>
+          <a:stretch>
+            <a:fillRect/>
+          </a:stretch>
+        </p:blipFill>
+        <p:spPr>
+          <a:xfrm>
+            <a:off x="0" y="-3571"/>
+            <a:ext cx="1066800" cy="406400"/>
+          </a:xfrm>
+          <a:prstGeom prst="rect">
+            <a:avLst/>
+          </a:prstGeom>
+        </p:spPr>
+      </p:pic>
+      <p:sp>
+        <p:nvSpPr>
+          <p:cNvPr id="11" name="Textfeld 10"/>
+          <p:cNvSpPr txBox="1"/>
+          <p:nvPr/>
+        </p:nvSpPr>
+        <p:spPr>
+          <a:xfrm>
+            <a:off x="633368" y="1623458"/>
+            <a:ext cx="6264696" cy="1200329"/>
+          </a:xfrm>
+          <a:prstGeom prst="rect">
+            <a:avLst/>
+          </a:prstGeom>
+          <a:noFill/>
+        </p:spPr>
+        <p:txBody>
+          <a:bodyPr wrap="square" rtlCol="0" anchor="t">
+            <a:spAutoFit/>
+          </a:bodyPr>
+          <a:lstStyle/>
+          <a:p>
+            <a:endParaRPr lang="de-CH" sz="2400" dirty="0">
+              <a:latin typeface="Calibri" panose="020F0502020204030204" pitchFamily="34" charset="0"/>
+            </a:endParaRPr>
+          </a:p>
+          <a:p>
+            <a:pPr lvl="1"/>
+            <a:endParaRPr lang="de-CH" sz="2400" dirty="0">
+              <a:latin typeface="Calibri" panose="020F0502020204030204" pitchFamily="34" charset="0"/>
+            </a:endParaRPr>
+          </a:p>
+          <a:p>
+            <a:pPr lvl="1"/>
+            <a:endParaRPr lang="de-CH" sz="2400" dirty="0">
+              <a:latin typeface="Calibri" panose="020F0502020204030204" pitchFamily="34" charset="0"/>
+            </a:endParaRPr>
+          </a:p>
+        </p:txBody>
+      </p:sp>
+      <p:cxnSp>
+        <p:nvCxnSpPr>
+          <p:cNvPr id="5" name="Gerade Verbindung 4"/>
+          <p:cNvCxnSpPr/>
+          <p:nvPr/>
+        </p:nvCxnSpPr>
+        <p:spPr>
+          <a:xfrm>
+            <a:off x="0" y="6525344"/>
+            <a:ext cx="9144000" cy="0"/>
+          </a:xfrm>
+          <a:prstGeom prst="line">
+            <a:avLst/>
+          </a:prstGeom>
+          <a:ln>
+            <a:solidFill>
+              <a:schemeClr val="tx1"/>
+            </a:solidFill>
+          </a:ln>
+        </p:spPr>
+        <p:style>
+          <a:lnRef idx="1">
+            <a:schemeClr val="accent1"/>
+          </a:lnRef>
+          <a:fillRef idx="0">
+            <a:schemeClr val="accent1"/>
+          </a:fillRef>
+          <a:effectRef idx="0">
+            <a:schemeClr val="accent1"/>
+          </a:effectRef>
+          <a:fontRef idx="minor">
+            <a:schemeClr val="tx1"/>
+          </a:fontRef>
+        </p:style>
+      </p:cxnSp>
+      <p:sp>
+        <p:nvSpPr>
+          <p:cNvPr id="6" name="Textfeld 5"/>
+          <p:cNvSpPr txBox="1"/>
+          <p:nvPr/>
+        </p:nvSpPr>
+        <p:spPr>
+          <a:xfrm>
+            <a:off x="287830" y="6542726"/>
+            <a:ext cx="1208792" cy="276999"/>
+          </a:xfrm>
+          <a:prstGeom prst="rect">
+            <a:avLst/>
+          </a:prstGeom>
+          <a:noFill/>
+        </p:spPr>
+        <p:txBody>
+          <a:bodyPr wrap="none" rtlCol="0">
+            <a:spAutoFit/>
+          </a:bodyPr>
+          <a:lstStyle/>
+          <a:p>
+            <a:r>
+              <a:rPr lang="de-CH" sz="1200" dirty="0">
+                <a:latin typeface="Calibri" panose="020F0502020204030204" pitchFamily="34" charset="0"/>
+              </a:rPr>
+              <a:t>Meilenstein_M2</a:t>
+            </a:r>
+          </a:p>
+        </p:txBody>
+      </p:sp>
+      <p:sp>
+        <p:nvSpPr>
+          <p:cNvPr id="8" name="Textfeld 7"/>
+          <p:cNvSpPr txBox="1"/>
+          <p:nvPr/>
+        </p:nvSpPr>
+        <p:spPr>
+          <a:xfrm>
+            <a:off x="3627204" y="6542724"/>
+            <a:ext cx="1800200" cy="276999"/>
+          </a:xfrm>
+          <a:prstGeom prst="rect">
+            <a:avLst/>
+          </a:prstGeom>
+          <a:noFill/>
+        </p:spPr>
+        <p:txBody>
+          <a:bodyPr wrap="square" rtlCol="0">
+            <a:spAutoFit/>
+          </a:bodyPr>
+          <a:lstStyle/>
+          <a:p>
+            <a:pPr algn="ctr"/>
+            <a:r>
+              <a:rPr lang="de-CH" sz="1200" dirty="0">
+                <a:latin typeface="Calibri" panose="020F0502020204030204" pitchFamily="34" charset="0"/>
+              </a:rPr>
+              <a:t>Seite 3/??</a:t>
+            </a:r>
+          </a:p>
+        </p:txBody>
+      </p:sp>
+      <p:cxnSp>
+        <p:nvCxnSpPr>
+          <p:cNvPr id="9" name="Gerade Verbindung 4"/>
+          <p:cNvCxnSpPr/>
+          <p:nvPr/>
+        </p:nvCxnSpPr>
+        <p:spPr>
+          <a:xfrm>
+            <a:off x="-5050" y="421597"/>
+            <a:ext cx="9144000" cy="0"/>
+          </a:xfrm>
+          <a:prstGeom prst="line">
+            <a:avLst/>
+          </a:prstGeom>
+          <a:ln>
+            <a:solidFill>
+              <a:schemeClr val="tx1"/>
+            </a:solidFill>
+          </a:ln>
+        </p:spPr>
+        <p:style>
+          <a:lnRef idx="1">
+            <a:schemeClr val="accent1"/>
+          </a:lnRef>
+          <a:fillRef idx="0">
+            <a:schemeClr val="accent1"/>
+          </a:fillRef>
+          <a:effectRef idx="0">
+            <a:schemeClr val="accent1"/>
+          </a:effectRef>
+          <a:fontRef idx="minor">
+            <a:schemeClr val="tx1"/>
+          </a:fontRef>
+        </p:style>
+      </p:cxnSp>
+      <p:sp>
+        <p:nvSpPr>
+          <p:cNvPr id="10" name="Textfeld 9"/>
+          <p:cNvSpPr txBox="1"/>
+          <p:nvPr/>
+        </p:nvSpPr>
+        <p:spPr>
+          <a:xfrm>
+            <a:off x="7615828" y="144598"/>
+            <a:ext cx="1265796" cy="276999"/>
+          </a:xfrm>
+          <a:prstGeom prst="rect">
+            <a:avLst/>
+          </a:prstGeom>
+          <a:noFill/>
+        </p:spPr>
+        <p:txBody>
+          <a:bodyPr wrap="none" rtlCol="0">
+            <a:spAutoFit/>
+          </a:bodyPr>
+          <a:lstStyle/>
+          <a:p>
+            <a:pPr algn="r"/>
+            <a:r>
+              <a:rPr lang="de-CH" sz="1200" dirty="0">
+                <a:latin typeface="Calibri" panose="020F0502020204030204" pitchFamily="34" charset="0"/>
+              </a:rPr>
+              <a:t>SysP18_Team_10</a:t>
+            </a:r>
+          </a:p>
+        </p:txBody>
+      </p:sp>
+      <p:sp>
+        <p:nvSpPr>
+          <p:cNvPr id="14" name="Textfeld 13"/>
+          <p:cNvSpPr txBox="1"/>
+          <p:nvPr/>
+        </p:nvSpPr>
+        <p:spPr>
+          <a:xfrm>
+            <a:off x="182812" y="499308"/>
+            <a:ext cx="4402111" cy="523220"/>
+          </a:xfrm>
+          <a:prstGeom prst="rect">
+            <a:avLst/>
+          </a:prstGeom>
+          <a:noFill/>
+        </p:spPr>
+        <p:txBody>
+          <a:bodyPr wrap="square" rtlCol="0">
+            <a:spAutoFit/>
+          </a:bodyPr>
+          <a:lstStyle/>
+          <a:p>
+            <a:r>
+              <a:rPr lang="de-CH" sz="2800" b="1" dirty="0">
+                <a:latin typeface="+mj-lt"/>
+              </a:rPr>
+              <a:t>Motorentreiber PCB 3D</a:t>
+            </a:r>
+          </a:p>
+        </p:txBody>
+      </p:sp>
+      <p:sp>
+        <p:nvSpPr>
+          <p:cNvPr id="16" name="Textfeld 15">
+            <a:extLst>
+              <a:ext uri="{FF2B5EF4-FFF2-40B4-BE49-F238E27FC236}">
+                <a16:creationId xmlns:a16="http://schemas.microsoft.com/office/drawing/2014/main" id="{0C9772D5-2A6B-4A49-9CE3-63851BD26ABD}"/>
+              </a:ext>
+            </a:extLst>
+          </p:cNvPr>
+          <p:cNvSpPr txBox="1"/>
+          <p:nvPr/>
+        </p:nvSpPr>
+        <p:spPr>
+          <a:xfrm>
+            <a:off x="7840953" y="6542725"/>
+            <a:ext cx="1040671" cy="276999"/>
+          </a:xfrm>
+          <a:prstGeom prst="rect">
+            <a:avLst/>
+          </a:prstGeom>
+          <a:noFill/>
+        </p:spPr>
+        <p:txBody>
+          <a:bodyPr wrap="none" rtlCol="0">
+            <a:spAutoFit/>
+          </a:bodyPr>
+          <a:lstStyle/>
+          <a:p>
+            <a:pPr algn="r"/>
+            <a:r>
+              <a:rPr lang="de-CH" sz="1200" dirty="0">
+                <a:latin typeface="Calibri" panose="020F0502020204030204" pitchFamily="34" charset="0"/>
+              </a:rPr>
+              <a:t>3.  März 2018</a:t>
+            </a:r>
+          </a:p>
+        </p:txBody>
+      </p:sp>
+      <p:pic>
+        <p:nvPicPr>
+          <p:cNvPr id="3" name="Grafik 2">
+            <a:extLst>
+              <a:ext uri="{FF2B5EF4-FFF2-40B4-BE49-F238E27FC236}">
+                <a16:creationId xmlns:a16="http://schemas.microsoft.com/office/drawing/2014/main" id="{C275CC21-65DC-4699-86D4-72440D283030}"/>
+              </a:ext>
+            </a:extLst>
+          </p:cNvPr>
+          <p:cNvPicPr>
+            <a:picLocks noChangeAspect="1"/>
+          </p:cNvPicPr>
+          <p:nvPr/>
+        </p:nvPicPr>
+        <p:blipFill>
+          <a:blip r:embed="rId3">
+            <a:extLst>
+              <a:ext uri="{28A0092B-C50C-407E-A947-70E740481C1C}">
+                <a14:useLocalDpi xmlns:a14="http://schemas.microsoft.com/office/drawing/2010/main" val="0"/>
+              </a:ext>
+            </a:extLst>
+          </a:blip>
+          <a:stretch>
+            <a:fillRect/>
+          </a:stretch>
+        </p:blipFill>
+        <p:spPr>
+          <a:xfrm>
+            <a:off x="1259632" y="980728"/>
+            <a:ext cx="6817810" cy="5304553"/>
+          </a:xfrm>
+          <a:prstGeom prst="rect">
+            <a:avLst/>
+          </a:prstGeom>
+        </p:spPr>
+      </p:pic>
+    </p:spTree>
+    <p:extLst>
+      <p:ext uri="{BB962C8B-B14F-4D97-AF65-F5344CB8AC3E}">
+        <p14:creationId xmlns:p14="http://schemas.microsoft.com/office/powerpoint/2010/main" val="1373219488"/>
       </p:ext>
     </p:extLst>
   </p:cSld>
@@ -4630,8 +6273,8 @@
         </p:nvSpPr>
         <p:spPr>
           <a:xfrm>
-            <a:off x="313905" y="1124744"/>
-            <a:ext cx="3492082" cy="523220"/>
+            <a:off x="305352" y="876682"/>
+            <a:ext cx="5850823" cy="523220"/>
           </a:xfrm>
           <a:prstGeom prst="rect">
             <a:avLst/>
@@ -4648,72 +6291,7 @@
               <a:rPr lang="de-CH" sz="2800" b="1" dirty="0">
                 <a:latin typeface="+mj-lt"/>
               </a:rPr>
-              <a:t>Folie mit Aufzählung</a:t>
-            </a:r>
-          </a:p>
-        </p:txBody>
-      </p:sp>
-      <p:sp>
-        <p:nvSpPr>
-          <p:cNvPr id="15" name="Textfeld 14">
-            <a:extLst>
-              <a:ext uri="{FF2B5EF4-FFF2-40B4-BE49-F238E27FC236}">
-                <a16:creationId xmlns:a16="http://schemas.microsoft.com/office/drawing/2014/main" id="{23C33090-455A-9B46-96E1-618074619DB9}"/>
-              </a:ext>
-            </a:extLst>
-          </p:cNvPr>
-          <p:cNvSpPr txBox="1"/>
-          <p:nvPr/>
-        </p:nvSpPr>
-        <p:spPr>
-          <a:xfrm>
-            <a:off x="633368" y="1623458"/>
-            <a:ext cx="6264696" cy="1200329"/>
-          </a:xfrm>
-          <a:prstGeom prst="rect">
-            <a:avLst/>
-          </a:prstGeom>
-          <a:noFill/>
-        </p:spPr>
-        <p:txBody>
-          <a:bodyPr wrap="square" rtlCol="0" anchor="t">
-            <a:spAutoFit/>
-          </a:bodyPr>
-          <a:lstStyle/>
-          <a:p>
-            <a:pPr marL="342900" indent="-342900">
-              <a:buFont typeface="Symbol" pitchFamily="2" charset="2"/>
-              <a:buChar char="-"/>
-            </a:pPr>
-            <a:r>
-              <a:rPr lang="de-CH" sz="2400" dirty="0">
-                <a:latin typeface="Calibri" panose="020F0502020204030204" pitchFamily="34" charset="0"/>
-              </a:rPr>
-              <a:t>Aufzählung</a:t>
-            </a:r>
-          </a:p>
-          <a:p>
-            <a:pPr marL="342900" indent="-342900">
-              <a:buFont typeface="Symbol" pitchFamily="2" charset="2"/>
-              <a:buChar char="-"/>
-            </a:pPr>
-            <a:r>
-              <a:rPr lang="de-CH" sz="2400" dirty="0">
-                <a:latin typeface="Calibri" panose="020F0502020204030204" pitchFamily="34" charset="0"/>
-              </a:rPr>
-              <a:t>Aufzählung</a:t>
-            </a:r>
-          </a:p>
-          <a:p>
-            <a:pPr marL="342900" indent="-342900">
-              <a:buFont typeface="Symbol" pitchFamily="2" charset="2"/>
-              <a:buChar char="-"/>
-            </a:pPr>
-            <a:r>
-              <a:rPr lang="de-CH" sz="2400" dirty="0">
-                <a:latin typeface="Calibri" panose="020F0502020204030204" pitchFamily="34" charset="0"/>
-              </a:rPr>
-              <a:t>Aufzählung</a:t>
+              <a:t>Erster Entwurf Sensoren und Diverses</a:t>
             </a:r>
           </a:p>
         </p:txBody>
@@ -4756,6 +6334,42 @@
           </a:p>
         </p:txBody>
       </p:sp>
+      <p:pic>
+        <p:nvPicPr>
+          <p:cNvPr id="3" name="Grafik 2">
+            <a:extLst>
+              <a:ext uri="{FF2B5EF4-FFF2-40B4-BE49-F238E27FC236}">
+                <a16:creationId xmlns:a16="http://schemas.microsoft.com/office/drawing/2014/main" id="{31BC6C3F-F926-43EC-84AF-1E6AA750ED55}"/>
+              </a:ext>
+            </a:extLst>
+          </p:cNvPr>
+          <p:cNvPicPr>
+            <a:picLocks noChangeAspect="1"/>
+          </p:cNvPicPr>
+          <p:nvPr/>
+        </p:nvPicPr>
+        <p:blipFill>
+          <a:blip r:embed="rId4">
+            <a:extLst>
+              <a:ext uri="{28A0092B-C50C-407E-A947-70E740481C1C}">
+                <a14:useLocalDpi xmlns:a14="http://schemas.microsoft.com/office/drawing/2010/main" val="0"/>
+              </a:ext>
+            </a:extLst>
+          </a:blip>
+          <a:stretch>
+            <a:fillRect/>
+          </a:stretch>
+        </p:blipFill>
+        <p:spPr>
+          <a:xfrm>
+            <a:off x="1208349" y="1907024"/>
+            <a:ext cx="6407479" cy="4229317"/>
+          </a:xfrm>
+          <a:prstGeom prst="rect">
+            <a:avLst/>
+          </a:prstGeom>
+        </p:spPr>
+      </p:pic>
     </p:spTree>
     <p:extLst>
       <p:ext uri="{BB962C8B-B14F-4D97-AF65-F5344CB8AC3E}">
@@ -4788,10 +6402,10 @@
       </p:grpSpPr>
       <p:pic>
         <p:nvPicPr>
-          <p:cNvPr id="13" name="Grafik 12">
+          <p:cNvPr id="12" name="Grafik 11">
             <a:extLst>
               <a:ext uri="{FF2B5EF4-FFF2-40B4-BE49-F238E27FC236}">
-                <a16:creationId xmlns:a16="http://schemas.microsoft.com/office/drawing/2014/main" id="{00453448-D0BE-BC4A-91C8-50E637D2FFD5}"/>
+                <a16:creationId xmlns:a16="http://schemas.microsoft.com/office/drawing/2014/main" id="{63518878-B2F8-9E42-B6D4-7C199E65E901}"/>
               </a:ext>
             </a:extLst>
           </p:cNvPr>
@@ -4801,7 +6415,7 @@
           <p:nvPr/>
         </p:nvPicPr>
         <p:blipFill>
-          <a:blip r:embed="rId2">
+          <a:blip r:embed="rId3">
             <a:extLst>
               <a:ext uri="{28A0092B-C50C-407E-A947-70E740481C1C}">
                 <a14:useLocalDpi xmlns:a14="http://schemas.microsoft.com/office/drawing/2010/main" val="0"/>
@@ -4822,46 +6436,6 @@
           </a:prstGeom>
         </p:spPr>
       </p:pic>
-      <p:sp>
-        <p:nvSpPr>
-          <p:cNvPr id="11" name="Textfeld 10"/>
-          <p:cNvSpPr txBox="1"/>
-          <p:nvPr/>
-        </p:nvSpPr>
-        <p:spPr>
-          <a:xfrm>
-            <a:off x="633368" y="1623458"/>
-            <a:ext cx="6264696" cy="1200329"/>
-          </a:xfrm>
-          <a:prstGeom prst="rect">
-            <a:avLst/>
-          </a:prstGeom>
-          <a:noFill/>
-        </p:spPr>
-        <p:txBody>
-          <a:bodyPr wrap="square" rtlCol="0" anchor="t">
-            <a:spAutoFit/>
-          </a:bodyPr>
-          <a:lstStyle/>
-          <a:p>
-            <a:endParaRPr lang="de-CH" sz="2400" dirty="0">
-              <a:latin typeface="Calibri" panose="020F0502020204030204" pitchFamily="34" charset="0"/>
-            </a:endParaRPr>
-          </a:p>
-          <a:p>
-            <a:pPr lvl="1"/>
-            <a:endParaRPr lang="de-CH" sz="2400" dirty="0">
-              <a:latin typeface="Calibri" panose="020F0502020204030204" pitchFamily="34" charset="0"/>
-            </a:endParaRPr>
-          </a:p>
-          <a:p>
-            <a:pPr lvl="1"/>
-            <a:endParaRPr lang="de-CH" sz="2400" dirty="0">
-              <a:latin typeface="Calibri" panose="020F0502020204030204" pitchFamily="34" charset="0"/>
-            </a:endParaRPr>
-          </a:p>
-        </p:txBody>
-      </p:sp>
       <p:cxnSp>
         <p:nvCxnSpPr>
           <p:cNvPr id="5" name="Gerade Verbindung 4"/>
@@ -4955,7 +6529,7 @@
               <a:rPr lang="de-CH" sz="1200" dirty="0">
                 <a:latin typeface="Calibri" panose="020F0502020204030204" pitchFamily="34" charset="0"/>
               </a:rPr>
-              <a:t>Seite 3/??</a:t>
+              <a:t>Seite 2/??</a:t>
             </a:r>
           </a:p>
         </p:txBody>
@@ -5035,8 +6609,8 @@
         </p:nvSpPr>
         <p:spPr>
           <a:xfrm>
-            <a:off x="313904" y="1124744"/>
-            <a:ext cx="4402111" cy="523220"/>
+            <a:off x="313905" y="1124744"/>
+            <a:ext cx="3492082" cy="523220"/>
           </a:xfrm>
           <a:prstGeom prst="rect">
             <a:avLst/>
@@ -5053,7 +6627,7 @@
               <a:rPr lang="de-CH" sz="2800" b="1" dirty="0">
                 <a:latin typeface="+mj-lt"/>
               </a:rPr>
-              <a:t>Folie leer</a:t>
+              <a:t>Entwurf Top Sheet</a:t>
             </a:r>
           </a:p>
         </p:txBody>
@@ -5063,7 +6637,7 @@
           <p:cNvPr id="16" name="Textfeld 15">
             <a:extLst>
               <a:ext uri="{FF2B5EF4-FFF2-40B4-BE49-F238E27FC236}">
-                <a16:creationId xmlns:a16="http://schemas.microsoft.com/office/drawing/2014/main" id="{0C9772D5-2A6B-4A49-9CE3-63851BD26ABD}"/>
+                <a16:creationId xmlns:a16="http://schemas.microsoft.com/office/drawing/2014/main" id="{2EBD323C-4D9D-5D42-9645-414FFBB7D04B}"/>
               </a:ext>
             </a:extLst>
           </p:cNvPr>
@@ -5096,10 +6670,1690 @@
           </a:p>
         </p:txBody>
       </p:sp>
+      <p:pic>
+        <p:nvPicPr>
+          <p:cNvPr id="3" name="Grafik 2">
+            <a:extLst>
+              <a:ext uri="{FF2B5EF4-FFF2-40B4-BE49-F238E27FC236}">
+                <a16:creationId xmlns:a16="http://schemas.microsoft.com/office/drawing/2014/main" id="{75C94E6E-AA38-40A8-BB2C-2B8DDD9C949A}"/>
+              </a:ext>
+            </a:extLst>
+          </p:cNvPr>
+          <p:cNvPicPr>
+            <a:picLocks noChangeAspect="1"/>
+          </p:cNvPicPr>
+          <p:nvPr/>
+        </p:nvPicPr>
+        <p:blipFill>
+          <a:blip r:embed="rId4">
+            <a:extLst>
+              <a:ext uri="{28A0092B-C50C-407E-A947-70E740481C1C}">
+                <a14:useLocalDpi xmlns:a14="http://schemas.microsoft.com/office/drawing/2010/main" val="0"/>
+              </a:ext>
+            </a:extLst>
+          </a:blip>
+          <a:stretch>
+            <a:fillRect/>
+          </a:stretch>
+        </p:blipFill>
+        <p:spPr>
+          <a:xfrm>
+            <a:off x="1066800" y="1860864"/>
+            <a:ext cx="6756747" cy="4451579"/>
+          </a:xfrm>
+          <a:prstGeom prst="rect">
+            <a:avLst/>
+          </a:prstGeom>
+        </p:spPr>
+      </p:pic>
     </p:spTree>
     <p:extLst>
       <p:ext uri="{BB962C8B-B14F-4D97-AF65-F5344CB8AC3E}">
-        <p14:creationId xmlns:p14="http://schemas.microsoft.com/office/powerpoint/2010/main" val="1373219488"/>
+        <p14:creationId xmlns:p14="http://schemas.microsoft.com/office/powerpoint/2010/main" val="3945394518"/>
+      </p:ext>
+    </p:extLst>
+  </p:cSld>
+  <p:clrMapOvr>
+    <a:masterClrMapping/>
+  </p:clrMapOvr>
+</p:sld>
+</file>
+
+<file path=ppt/slides/slide5.xml><?xml version="1.0" encoding="utf-8"?>
+<p:sld xmlns:a="http://schemas.openxmlformats.org/drawingml/2006/main" xmlns:r="http://schemas.openxmlformats.org/officeDocument/2006/relationships" xmlns:p="http://schemas.openxmlformats.org/presentationml/2006/main">
+  <p:cSld>
+    <p:spTree>
+      <p:nvGrpSpPr>
+        <p:cNvPr id="1" name=""/>
+        <p:cNvGrpSpPr/>
+        <p:nvPr/>
+      </p:nvGrpSpPr>
+      <p:grpSpPr>
+        <a:xfrm>
+          <a:off x="0" y="0"/>
+          <a:ext cx="0" cy="0"/>
+          <a:chOff x="0" y="0"/>
+          <a:chExt cx="0" cy="0"/>
+        </a:xfrm>
+      </p:grpSpPr>
+      <p:pic>
+        <p:nvPicPr>
+          <p:cNvPr id="12" name="Grafik 11">
+            <a:extLst>
+              <a:ext uri="{FF2B5EF4-FFF2-40B4-BE49-F238E27FC236}">
+                <a16:creationId xmlns:a16="http://schemas.microsoft.com/office/drawing/2014/main" id="{63518878-B2F8-9E42-B6D4-7C199E65E901}"/>
+              </a:ext>
+            </a:extLst>
+          </p:cNvPr>
+          <p:cNvPicPr>
+            <a:picLocks noChangeAspect="1"/>
+          </p:cNvPicPr>
+          <p:nvPr/>
+        </p:nvPicPr>
+        <p:blipFill>
+          <a:blip r:embed="rId3">
+            <a:extLst>
+              <a:ext uri="{28A0092B-C50C-407E-A947-70E740481C1C}">
+                <a14:useLocalDpi xmlns:a14="http://schemas.microsoft.com/office/drawing/2010/main" val="0"/>
+              </a:ext>
+            </a:extLst>
+          </a:blip>
+          <a:stretch>
+            <a:fillRect/>
+          </a:stretch>
+        </p:blipFill>
+        <p:spPr>
+          <a:xfrm>
+            <a:off x="0" y="-3571"/>
+            <a:ext cx="1066800" cy="406400"/>
+          </a:xfrm>
+          <a:prstGeom prst="rect">
+            <a:avLst/>
+          </a:prstGeom>
+        </p:spPr>
+      </p:pic>
+      <p:cxnSp>
+        <p:nvCxnSpPr>
+          <p:cNvPr id="5" name="Gerade Verbindung 4"/>
+          <p:cNvCxnSpPr/>
+          <p:nvPr/>
+        </p:nvCxnSpPr>
+        <p:spPr>
+          <a:xfrm>
+            <a:off x="0" y="6525344"/>
+            <a:ext cx="9144000" cy="0"/>
+          </a:xfrm>
+          <a:prstGeom prst="line">
+            <a:avLst/>
+          </a:prstGeom>
+          <a:ln>
+            <a:solidFill>
+              <a:schemeClr val="tx1"/>
+            </a:solidFill>
+          </a:ln>
+        </p:spPr>
+        <p:style>
+          <a:lnRef idx="1">
+            <a:schemeClr val="accent1"/>
+          </a:lnRef>
+          <a:fillRef idx="0">
+            <a:schemeClr val="accent1"/>
+          </a:fillRef>
+          <a:effectRef idx="0">
+            <a:schemeClr val="accent1"/>
+          </a:effectRef>
+          <a:fontRef idx="minor">
+            <a:schemeClr val="tx1"/>
+          </a:fontRef>
+        </p:style>
+      </p:cxnSp>
+      <p:sp>
+        <p:nvSpPr>
+          <p:cNvPr id="6" name="Textfeld 5"/>
+          <p:cNvSpPr txBox="1"/>
+          <p:nvPr/>
+        </p:nvSpPr>
+        <p:spPr>
+          <a:xfrm>
+            <a:off x="287830" y="6542726"/>
+            <a:ext cx="1208792" cy="276999"/>
+          </a:xfrm>
+          <a:prstGeom prst="rect">
+            <a:avLst/>
+          </a:prstGeom>
+          <a:noFill/>
+        </p:spPr>
+        <p:txBody>
+          <a:bodyPr wrap="none" rtlCol="0">
+            <a:spAutoFit/>
+          </a:bodyPr>
+          <a:lstStyle/>
+          <a:p>
+            <a:r>
+              <a:rPr lang="de-CH" sz="1200" dirty="0">
+                <a:latin typeface="Calibri" panose="020F0502020204030204" pitchFamily="34" charset="0"/>
+              </a:rPr>
+              <a:t>Meilenstein_M2</a:t>
+            </a:r>
+          </a:p>
+        </p:txBody>
+      </p:sp>
+      <p:sp>
+        <p:nvSpPr>
+          <p:cNvPr id="8" name="Textfeld 7"/>
+          <p:cNvSpPr txBox="1"/>
+          <p:nvPr/>
+        </p:nvSpPr>
+        <p:spPr>
+          <a:xfrm>
+            <a:off x="3627204" y="6542724"/>
+            <a:ext cx="1800200" cy="276999"/>
+          </a:xfrm>
+          <a:prstGeom prst="rect">
+            <a:avLst/>
+          </a:prstGeom>
+          <a:noFill/>
+        </p:spPr>
+        <p:txBody>
+          <a:bodyPr wrap="square" rtlCol="0">
+            <a:spAutoFit/>
+          </a:bodyPr>
+          <a:lstStyle/>
+          <a:p>
+            <a:pPr algn="ctr"/>
+            <a:r>
+              <a:rPr lang="de-CH" sz="1200" dirty="0">
+                <a:latin typeface="Calibri" panose="020F0502020204030204" pitchFamily="34" charset="0"/>
+              </a:rPr>
+              <a:t>Seite 2/??</a:t>
+            </a:r>
+          </a:p>
+        </p:txBody>
+      </p:sp>
+      <p:cxnSp>
+        <p:nvCxnSpPr>
+          <p:cNvPr id="9" name="Gerade Verbindung 4"/>
+          <p:cNvCxnSpPr/>
+          <p:nvPr/>
+        </p:nvCxnSpPr>
+        <p:spPr>
+          <a:xfrm>
+            <a:off x="-5050" y="421597"/>
+            <a:ext cx="9144000" cy="0"/>
+          </a:xfrm>
+          <a:prstGeom prst="line">
+            <a:avLst/>
+          </a:prstGeom>
+          <a:ln>
+            <a:solidFill>
+              <a:schemeClr val="tx1"/>
+            </a:solidFill>
+          </a:ln>
+        </p:spPr>
+        <p:style>
+          <a:lnRef idx="1">
+            <a:schemeClr val="accent1"/>
+          </a:lnRef>
+          <a:fillRef idx="0">
+            <a:schemeClr val="accent1"/>
+          </a:fillRef>
+          <a:effectRef idx="0">
+            <a:schemeClr val="accent1"/>
+          </a:effectRef>
+          <a:fontRef idx="minor">
+            <a:schemeClr val="tx1"/>
+          </a:fontRef>
+        </p:style>
+      </p:cxnSp>
+      <p:sp>
+        <p:nvSpPr>
+          <p:cNvPr id="10" name="Textfeld 9"/>
+          <p:cNvSpPr txBox="1"/>
+          <p:nvPr/>
+        </p:nvSpPr>
+        <p:spPr>
+          <a:xfrm>
+            <a:off x="7615828" y="144598"/>
+            <a:ext cx="1265796" cy="276999"/>
+          </a:xfrm>
+          <a:prstGeom prst="rect">
+            <a:avLst/>
+          </a:prstGeom>
+          <a:noFill/>
+        </p:spPr>
+        <p:txBody>
+          <a:bodyPr wrap="none" rtlCol="0">
+            <a:spAutoFit/>
+          </a:bodyPr>
+          <a:lstStyle/>
+          <a:p>
+            <a:pPr algn="r"/>
+            <a:r>
+              <a:rPr lang="de-CH" sz="1200" dirty="0">
+                <a:latin typeface="Calibri" panose="020F0502020204030204" pitchFamily="34" charset="0"/>
+              </a:rPr>
+              <a:t>SysP18_Team_10</a:t>
+            </a:r>
+          </a:p>
+        </p:txBody>
+      </p:sp>
+      <p:sp>
+        <p:nvSpPr>
+          <p:cNvPr id="14" name="Textfeld 13"/>
+          <p:cNvSpPr txBox="1"/>
+          <p:nvPr/>
+        </p:nvSpPr>
+        <p:spPr>
+          <a:xfrm>
+            <a:off x="611560" y="765477"/>
+            <a:ext cx="3492082" cy="523220"/>
+          </a:xfrm>
+          <a:prstGeom prst="rect">
+            <a:avLst/>
+          </a:prstGeom>
+          <a:noFill/>
+        </p:spPr>
+        <p:txBody>
+          <a:bodyPr wrap="square" rtlCol="0">
+            <a:spAutoFit/>
+          </a:bodyPr>
+          <a:lstStyle/>
+          <a:p>
+            <a:r>
+              <a:rPr lang="de-CH" sz="2800" b="1" dirty="0">
+                <a:latin typeface="+mj-lt"/>
+              </a:rPr>
+              <a:t>Top Sheet Aktuell</a:t>
+            </a:r>
+          </a:p>
+        </p:txBody>
+      </p:sp>
+      <p:sp>
+        <p:nvSpPr>
+          <p:cNvPr id="16" name="Textfeld 15">
+            <a:extLst>
+              <a:ext uri="{FF2B5EF4-FFF2-40B4-BE49-F238E27FC236}">
+                <a16:creationId xmlns:a16="http://schemas.microsoft.com/office/drawing/2014/main" id="{2EBD323C-4D9D-5D42-9645-414FFBB7D04B}"/>
+              </a:ext>
+            </a:extLst>
+          </p:cNvPr>
+          <p:cNvSpPr txBox="1"/>
+          <p:nvPr/>
+        </p:nvSpPr>
+        <p:spPr>
+          <a:xfrm>
+            <a:off x="7840953" y="6542725"/>
+            <a:ext cx="1040671" cy="276999"/>
+          </a:xfrm>
+          <a:prstGeom prst="rect">
+            <a:avLst/>
+          </a:prstGeom>
+          <a:noFill/>
+        </p:spPr>
+        <p:txBody>
+          <a:bodyPr wrap="none" rtlCol="0">
+            <a:spAutoFit/>
+          </a:bodyPr>
+          <a:lstStyle/>
+          <a:p>
+            <a:pPr algn="r"/>
+            <a:r>
+              <a:rPr lang="de-CH" sz="1200" dirty="0">
+                <a:latin typeface="Calibri" panose="020F0502020204030204" pitchFamily="34" charset="0"/>
+              </a:rPr>
+              <a:t>3.  März 2018</a:t>
+            </a:r>
+          </a:p>
+        </p:txBody>
+      </p:sp>
+      <p:pic>
+        <p:nvPicPr>
+          <p:cNvPr id="11" name="Grafik 10">
+            <a:extLst>
+              <a:ext uri="{FF2B5EF4-FFF2-40B4-BE49-F238E27FC236}">
+                <a16:creationId xmlns:a16="http://schemas.microsoft.com/office/drawing/2014/main" id="{D367EEA3-40E9-47DF-8CB4-6354EA244FEF}"/>
+              </a:ext>
+            </a:extLst>
+          </p:cNvPr>
+          <p:cNvPicPr>
+            <a:picLocks noChangeAspect="1"/>
+          </p:cNvPicPr>
+          <p:nvPr/>
+        </p:nvPicPr>
+        <p:blipFill>
+          <a:blip r:embed="rId4">
+            <a:extLst>
+              <a:ext uri="{28A0092B-C50C-407E-A947-70E740481C1C}">
+                <a14:useLocalDpi xmlns:a14="http://schemas.microsoft.com/office/drawing/2010/main" val="0"/>
+              </a:ext>
+            </a:extLst>
+          </a:blip>
+          <a:stretch>
+            <a:fillRect/>
+          </a:stretch>
+        </p:blipFill>
+        <p:spPr>
+          <a:xfrm>
+            <a:off x="1898512" y="2066855"/>
+            <a:ext cx="5346975" cy="2724290"/>
+          </a:xfrm>
+          <a:prstGeom prst="rect">
+            <a:avLst/>
+          </a:prstGeom>
+        </p:spPr>
+      </p:pic>
+    </p:spTree>
+    <p:extLst>
+      <p:ext uri="{BB962C8B-B14F-4D97-AF65-F5344CB8AC3E}">
+        <p14:creationId xmlns:p14="http://schemas.microsoft.com/office/powerpoint/2010/main" val="863303198"/>
+      </p:ext>
+    </p:extLst>
+  </p:cSld>
+  <p:clrMapOvr>
+    <a:masterClrMapping/>
+  </p:clrMapOvr>
+</p:sld>
+</file>
+
+<file path=ppt/slides/slide6.xml><?xml version="1.0" encoding="utf-8"?>
+<p:sld xmlns:a="http://schemas.openxmlformats.org/drawingml/2006/main" xmlns:r="http://schemas.openxmlformats.org/officeDocument/2006/relationships" xmlns:p="http://schemas.openxmlformats.org/presentationml/2006/main">
+  <p:cSld>
+    <p:spTree>
+      <p:nvGrpSpPr>
+        <p:cNvPr id="1" name=""/>
+        <p:cNvGrpSpPr/>
+        <p:nvPr/>
+      </p:nvGrpSpPr>
+      <p:grpSpPr>
+        <a:xfrm>
+          <a:off x="0" y="0"/>
+          <a:ext cx="0" cy="0"/>
+          <a:chOff x="0" y="0"/>
+          <a:chExt cx="0" cy="0"/>
+        </a:xfrm>
+      </p:grpSpPr>
+      <p:pic>
+        <p:nvPicPr>
+          <p:cNvPr id="12" name="Grafik 11">
+            <a:extLst>
+              <a:ext uri="{FF2B5EF4-FFF2-40B4-BE49-F238E27FC236}">
+                <a16:creationId xmlns:a16="http://schemas.microsoft.com/office/drawing/2014/main" id="{63518878-B2F8-9E42-B6D4-7C199E65E901}"/>
+              </a:ext>
+            </a:extLst>
+          </p:cNvPr>
+          <p:cNvPicPr>
+            <a:picLocks noChangeAspect="1"/>
+          </p:cNvPicPr>
+          <p:nvPr/>
+        </p:nvPicPr>
+        <p:blipFill>
+          <a:blip r:embed="rId3">
+            <a:extLst>
+              <a:ext uri="{28A0092B-C50C-407E-A947-70E740481C1C}">
+                <a14:useLocalDpi xmlns:a14="http://schemas.microsoft.com/office/drawing/2010/main" val="0"/>
+              </a:ext>
+            </a:extLst>
+          </a:blip>
+          <a:stretch>
+            <a:fillRect/>
+          </a:stretch>
+        </p:blipFill>
+        <p:spPr>
+          <a:xfrm>
+            <a:off x="0" y="-3571"/>
+            <a:ext cx="1066800" cy="406400"/>
+          </a:xfrm>
+          <a:prstGeom prst="rect">
+            <a:avLst/>
+          </a:prstGeom>
+        </p:spPr>
+      </p:pic>
+      <p:cxnSp>
+        <p:nvCxnSpPr>
+          <p:cNvPr id="5" name="Gerade Verbindung 4"/>
+          <p:cNvCxnSpPr/>
+          <p:nvPr/>
+        </p:nvCxnSpPr>
+        <p:spPr>
+          <a:xfrm>
+            <a:off x="0" y="6525344"/>
+            <a:ext cx="9144000" cy="0"/>
+          </a:xfrm>
+          <a:prstGeom prst="line">
+            <a:avLst/>
+          </a:prstGeom>
+          <a:ln>
+            <a:solidFill>
+              <a:schemeClr val="tx1"/>
+            </a:solidFill>
+          </a:ln>
+        </p:spPr>
+        <p:style>
+          <a:lnRef idx="1">
+            <a:schemeClr val="accent1"/>
+          </a:lnRef>
+          <a:fillRef idx="0">
+            <a:schemeClr val="accent1"/>
+          </a:fillRef>
+          <a:effectRef idx="0">
+            <a:schemeClr val="accent1"/>
+          </a:effectRef>
+          <a:fontRef idx="minor">
+            <a:schemeClr val="tx1"/>
+          </a:fontRef>
+        </p:style>
+      </p:cxnSp>
+      <p:sp>
+        <p:nvSpPr>
+          <p:cNvPr id="6" name="Textfeld 5"/>
+          <p:cNvSpPr txBox="1"/>
+          <p:nvPr/>
+        </p:nvSpPr>
+        <p:spPr>
+          <a:xfrm>
+            <a:off x="287830" y="6542726"/>
+            <a:ext cx="1208792" cy="276999"/>
+          </a:xfrm>
+          <a:prstGeom prst="rect">
+            <a:avLst/>
+          </a:prstGeom>
+          <a:noFill/>
+        </p:spPr>
+        <p:txBody>
+          <a:bodyPr wrap="none" rtlCol="0">
+            <a:spAutoFit/>
+          </a:bodyPr>
+          <a:lstStyle/>
+          <a:p>
+            <a:r>
+              <a:rPr lang="de-CH" sz="1200" dirty="0">
+                <a:latin typeface="Calibri" panose="020F0502020204030204" pitchFamily="34" charset="0"/>
+              </a:rPr>
+              <a:t>Meilenstein_M2</a:t>
+            </a:r>
+          </a:p>
+        </p:txBody>
+      </p:sp>
+      <p:sp>
+        <p:nvSpPr>
+          <p:cNvPr id="8" name="Textfeld 7"/>
+          <p:cNvSpPr txBox="1"/>
+          <p:nvPr/>
+        </p:nvSpPr>
+        <p:spPr>
+          <a:xfrm>
+            <a:off x="3627204" y="6542724"/>
+            <a:ext cx="1800200" cy="276999"/>
+          </a:xfrm>
+          <a:prstGeom prst="rect">
+            <a:avLst/>
+          </a:prstGeom>
+          <a:noFill/>
+        </p:spPr>
+        <p:txBody>
+          <a:bodyPr wrap="square" rtlCol="0">
+            <a:spAutoFit/>
+          </a:bodyPr>
+          <a:lstStyle/>
+          <a:p>
+            <a:pPr algn="ctr"/>
+            <a:r>
+              <a:rPr lang="de-CH" sz="1200" dirty="0">
+                <a:latin typeface="Calibri" panose="020F0502020204030204" pitchFamily="34" charset="0"/>
+              </a:rPr>
+              <a:t>Seite 2/??</a:t>
+            </a:r>
+          </a:p>
+        </p:txBody>
+      </p:sp>
+      <p:cxnSp>
+        <p:nvCxnSpPr>
+          <p:cNvPr id="9" name="Gerade Verbindung 4"/>
+          <p:cNvCxnSpPr/>
+          <p:nvPr/>
+        </p:nvCxnSpPr>
+        <p:spPr>
+          <a:xfrm>
+            <a:off x="-5050" y="421597"/>
+            <a:ext cx="9144000" cy="0"/>
+          </a:xfrm>
+          <a:prstGeom prst="line">
+            <a:avLst/>
+          </a:prstGeom>
+          <a:ln>
+            <a:solidFill>
+              <a:schemeClr val="tx1"/>
+            </a:solidFill>
+          </a:ln>
+        </p:spPr>
+        <p:style>
+          <a:lnRef idx="1">
+            <a:schemeClr val="accent1"/>
+          </a:lnRef>
+          <a:fillRef idx="0">
+            <a:schemeClr val="accent1"/>
+          </a:fillRef>
+          <a:effectRef idx="0">
+            <a:schemeClr val="accent1"/>
+          </a:effectRef>
+          <a:fontRef idx="minor">
+            <a:schemeClr val="tx1"/>
+          </a:fontRef>
+        </p:style>
+      </p:cxnSp>
+      <p:sp>
+        <p:nvSpPr>
+          <p:cNvPr id="10" name="Textfeld 9"/>
+          <p:cNvSpPr txBox="1"/>
+          <p:nvPr/>
+        </p:nvSpPr>
+        <p:spPr>
+          <a:xfrm>
+            <a:off x="7615828" y="144598"/>
+            <a:ext cx="1265796" cy="276999"/>
+          </a:xfrm>
+          <a:prstGeom prst="rect">
+            <a:avLst/>
+          </a:prstGeom>
+          <a:noFill/>
+        </p:spPr>
+        <p:txBody>
+          <a:bodyPr wrap="none" rtlCol="0">
+            <a:spAutoFit/>
+          </a:bodyPr>
+          <a:lstStyle/>
+          <a:p>
+            <a:pPr algn="r"/>
+            <a:r>
+              <a:rPr lang="de-CH" sz="1200" dirty="0">
+                <a:latin typeface="Calibri" panose="020F0502020204030204" pitchFamily="34" charset="0"/>
+              </a:rPr>
+              <a:t>SysP18_Team_10</a:t>
+            </a:r>
+          </a:p>
+        </p:txBody>
+      </p:sp>
+      <p:sp>
+        <p:nvSpPr>
+          <p:cNvPr id="14" name="Textfeld 13"/>
+          <p:cNvSpPr txBox="1"/>
+          <p:nvPr/>
+        </p:nvSpPr>
+        <p:spPr>
+          <a:xfrm>
+            <a:off x="287830" y="1017112"/>
+            <a:ext cx="3492082" cy="523220"/>
+          </a:xfrm>
+          <a:prstGeom prst="rect">
+            <a:avLst/>
+          </a:prstGeom>
+          <a:noFill/>
+        </p:spPr>
+        <p:txBody>
+          <a:bodyPr wrap="square" rtlCol="0">
+            <a:spAutoFit/>
+          </a:bodyPr>
+          <a:lstStyle/>
+          <a:p>
+            <a:r>
+              <a:rPr lang="de-CH" sz="2800" b="1" dirty="0">
+                <a:latin typeface="+mj-lt"/>
+              </a:rPr>
+              <a:t>MPC 555 und Diverses</a:t>
+            </a:r>
+          </a:p>
+        </p:txBody>
+      </p:sp>
+      <p:sp>
+        <p:nvSpPr>
+          <p:cNvPr id="16" name="Textfeld 15">
+            <a:extLst>
+              <a:ext uri="{FF2B5EF4-FFF2-40B4-BE49-F238E27FC236}">
+                <a16:creationId xmlns:a16="http://schemas.microsoft.com/office/drawing/2014/main" id="{2EBD323C-4D9D-5D42-9645-414FFBB7D04B}"/>
+              </a:ext>
+            </a:extLst>
+          </p:cNvPr>
+          <p:cNvSpPr txBox="1"/>
+          <p:nvPr/>
+        </p:nvSpPr>
+        <p:spPr>
+          <a:xfrm>
+            <a:off x="7840953" y="6542725"/>
+            <a:ext cx="1040671" cy="276999"/>
+          </a:xfrm>
+          <a:prstGeom prst="rect">
+            <a:avLst/>
+          </a:prstGeom>
+          <a:noFill/>
+        </p:spPr>
+        <p:txBody>
+          <a:bodyPr wrap="none" rtlCol="0">
+            <a:spAutoFit/>
+          </a:bodyPr>
+          <a:lstStyle/>
+          <a:p>
+            <a:pPr algn="r"/>
+            <a:r>
+              <a:rPr lang="de-CH" sz="1200" dirty="0">
+                <a:latin typeface="Calibri" panose="020F0502020204030204" pitchFamily="34" charset="0"/>
+              </a:rPr>
+              <a:t>3.  März 2018</a:t>
+            </a:r>
+          </a:p>
+        </p:txBody>
+      </p:sp>
+      <p:pic>
+        <p:nvPicPr>
+          <p:cNvPr id="11" name="Grafik 10">
+            <a:extLst>
+              <a:ext uri="{FF2B5EF4-FFF2-40B4-BE49-F238E27FC236}">
+                <a16:creationId xmlns:a16="http://schemas.microsoft.com/office/drawing/2014/main" id="{CFCE9FE3-A7BF-41AF-9AF2-EB3C904F44D0}"/>
+              </a:ext>
+            </a:extLst>
+          </p:cNvPr>
+          <p:cNvPicPr>
+            <a:picLocks noChangeAspect="1"/>
+          </p:cNvPicPr>
+          <p:nvPr/>
+        </p:nvPicPr>
+        <p:blipFill>
+          <a:blip r:embed="rId4">
+            <a:extLst>
+              <a:ext uri="{28A0092B-C50C-407E-A947-70E740481C1C}">
+                <a14:useLocalDpi xmlns:a14="http://schemas.microsoft.com/office/drawing/2010/main" val="0"/>
+              </a:ext>
+            </a:extLst>
+          </a:blip>
+          <a:stretch>
+            <a:fillRect/>
+          </a:stretch>
+        </p:blipFill>
+        <p:spPr>
+          <a:xfrm>
+            <a:off x="1333090" y="1844824"/>
+            <a:ext cx="6388428" cy="4235668"/>
+          </a:xfrm>
+          <a:prstGeom prst="rect">
+            <a:avLst/>
+          </a:prstGeom>
+        </p:spPr>
+      </p:pic>
+    </p:spTree>
+    <p:extLst>
+      <p:ext uri="{BB962C8B-B14F-4D97-AF65-F5344CB8AC3E}">
+        <p14:creationId xmlns:p14="http://schemas.microsoft.com/office/powerpoint/2010/main" val="1521330695"/>
+      </p:ext>
+    </p:extLst>
+  </p:cSld>
+  <p:clrMapOvr>
+    <a:masterClrMapping/>
+  </p:clrMapOvr>
+</p:sld>
+</file>
+
+<file path=ppt/slides/slide7.xml><?xml version="1.0" encoding="utf-8"?>
+<p:sld xmlns:a="http://schemas.openxmlformats.org/drawingml/2006/main" xmlns:r="http://schemas.openxmlformats.org/officeDocument/2006/relationships" xmlns:p="http://schemas.openxmlformats.org/presentationml/2006/main">
+  <p:cSld>
+    <p:spTree>
+      <p:nvGrpSpPr>
+        <p:cNvPr id="1" name=""/>
+        <p:cNvGrpSpPr/>
+        <p:nvPr/>
+      </p:nvGrpSpPr>
+      <p:grpSpPr>
+        <a:xfrm>
+          <a:off x="0" y="0"/>
+          <a:ext cx="0" cy="0"/>
+          <a:chOff x="0" y="0"/>
+          <a:chExt cx="0" cy="0"/>
+        </a:xfrm>
+      </p:grpSpPr>
+      <p:pic>
+        <p:nvPicPr>
+          <p:cNvPr id="12" name="Grafik 11">
+            <a:extLst>
+              <a:ext uri="{FF2B5EF4-FFF2-40B4-BE49-F238E27FC236}">
+                <a16:creationId xmlns:a16="http://schemas.microsoft.com/office/drawing/2014/main" id="{63518878-B2F8-9E42-B6D4-7C199E65E901}"/>
+              </a:ext>
+            </a:extLst>
+          </p:cNvPr>
+          <p:cNvPicPr>
+            <a:picLocks noChangeAspect="1"/>
+          </p:cNvPicPr>
+          <p:nvPr/>
+        </p:nvPicPr>
+        <p:blipFill>
+          <a:blip r:embed="rId3">
+            <a:extLst>
+              <a:ext uri="{28A0092B-C50C-407E-A947-70E740481C1C}">
+                <a14:useLocalDpi xmlns:a14="http://schemas.microsoft.com/office/drawing/2010/main" val="0"/>
+              </a:ext>
+            </a:extLst>
+          </a:blip>
+          <a:stretch>
+            <a:fillRect/>
+          </a:stretch>
+        </p:blipFill>
+        <p:spPr>
+          <a:xfrm>
+            <a:off x="0" y="-3571"/>
+            <a:ext cx="1066800" cy="406400"/>
+          </a:xfrm>
+          <a:prstGeom prst="rect">
+            <a:avLst/>
+          </a:prstGeom>
+        </p:spPr>
+      </p:pic>
+      <p:cxnSp>
+        <p:nvCxnSpPr>
+          <p:cNvPr id="5" name="Gerade Verbindung 4"/>
+          <p:cNvCxnSpPr/>
+          <p:nvPr/>
+        </p:nvCxnSpPr>
+        <p:spPr>
+          <a:xfrm>
+            <a:off x="0" y="6525344"/>
+            <a:ext cx="9144000" cy="0"/>
+          </a:xfrm>
+          <a:prstGeom prst="line">
+            <a:avLst/>
+          </a:prstGeom>
+          <a:ln>
+            <a:solidFill>
+              <a:schemeClr val="tx1"/>
+            </a:solidFill>
+          </a:ln>
+        </p:spPr>
+        <p:style>
+          <a:lnRef idx="1">
+            <a:schemeClr val="accent1"/>
+          </a:lnRef>
+          <a:fillRef idx="0">
+            <a:schemeClr val="accent1"/>
+          </a:fillRef>
+          <a:effectRef idx="0">
+            <a:schemeClr val="accent1"/>
+          </a:effectRef>
+          <a:fontRef idx="minor">
+            <a:schemeClr val="tx1"/>
+          </a:fontRef>
+        </p:style>
+      </p:cxnSp>
+      <p:sp>
+        <p:nvSpPr>
+          <p:cNvPr id="6" name="Textfeld 5"/>
+          <p:cNvSpPr txBox="1"/>
+          <p:nvPr/>
+        </p:nvSpPr>
+        <p:spPr>
+          <a:xfrm>
+            <a:off x="287830" y="6542726"/>
+            <a:ext cx="1208792" cy="276999"/>
+          </a:xfrm>
+          <a:prstGeom prst="rect">
+            <a:avLst/>
+          </a:prstGeom>
+          <a:noFill/>
+        </p:spPr>
+        <p:txBody>
+          <a:bodyPr wrap="none" rtlCol="0">
+            <a:spAutoFit/>
+          </a:bodyPr>
+          <a:lstStyle/>
+          <a:p>
+            <a:r>
+              <a:rPr lang="de-CH" sz="1200" dirty="0">
+                <a:latin typeface="Calibri" panose="020F0502020204030204" pitchFamily="34" charset="0"/>
+              </a:rPr>
+              <a:t>Meilenstein_M2</a:t>
+            </a:r>
+          </a:p>
+        </p:txBody>
+      </p:sp>
+      <p:sp>
+        <p:nvSpPr>
+          <p:cNvPr id="8" name="Textfeld 7"/>
+          <p:cNvSpPr txBox="1"/>
+          <p:nvPr/>
+        </p:nvSpPr>
+        <p:spPr>
+          <a:xfrm>
+            <a:off x="3627204" y="6542724"/>
+            <a:ext cx="1800200" cy="276999"/>
+          </a:xfrm>
+          <a:prstGeom prst="rect">
+            <a:avLst/>
+          </a:prstGeom>
+          <a:noFill/>
+        </p:spPr>
+        <p:txBody>
+          <a:bodyPr wrap="square" rtlCol="0">
+            <a:spAutoFit/>
+          </a:bodyPr>
+          <a:lstStyle/>
+          <a:p>
+            <a:pPr algn="ctr"/>
+            <a:r>
+              <a:rPr lang="de-CH" sz="1200" dirty="0">
+                <a:latin typeface="Calibri" panose="020F0502020204030204" pitchFamily="34" charset="0"/>
+              </a:rPr>
+              <a:t>Seite 2/??</a:t>
+            </a:r>
+          </a:p>
+        </p:txBody>
+      </p:sp>
+      <p:cxnSp>
+        <p:nvCxnSpPr>
+          <p:cNvPr id="9" name="Gerade Verbindung 4"/>
+          <p:cNvCxnSpPr/>
+          <p:nvPr/>
+        </p:nvCxnSpPr>
+        <p:spPr>
+          <a:xfrm>
+            <a:off x="-5050" y="421597"/>
+            <a:ext cx="9144000" cy="0"/>
+          </a:xfrm>
+          <a:prstGeom prst="line">
+            <a:avLst/>
+          </a:prstGeom>
+          <a:ln>
+            <a:solidFill>
+              <a:schemeClr val="tx1"/>
+            </a:solidFill>
+          </a:ln>
+        </p:spPr>
+        <p:style>
+          <a:lnRef idx="1">
+            <a:schemeClr val="accent1"/>
+          </a:lnRef>
+          <a:fillRef idx="0">
+            <a:schemeClr val="accent1"/>
+          </a:fillRef>
+          <a:effectRef idx="0">
+            <a:schemeClr val="accent1"/>
+          </a:effectRef>
+          <a:fontRef idx="minor">
+            <a:schemeClr val="tx1"/>
+          </a:fontRef>
+        </p:style>
+      </p:cxnSp>
+      <p:sp>
+        <p:nvSpPr>
+          <p:cNvPr id="10" name="Textfeld 9"/>
+          <p:cNvSpPr txBox="1"/>
+          <p:nvPr/>
+        </p:nvSpPr>
+        <p:spPr>
+          <a:xfrm>
+            <a:off x="7615828" y="144598"/>
+            <a:ext cx="1265796" cy="276999"/>
+          </a:xfrm>
+          <a:prstGeom prst="rect">
+            <a:avLst/>
+          </a:prstGeom>
+          <a:noFill/>
+        </p:spPr>
+        <p:txBody>
+          <a:bodyPr wrap="none" rtlCol="0">
+            <a:spAutoFit/>
+          </a:bodyPr>
+          <a:lstStyle/>
+          <a:p>
+            <a:pPr algn="r"/>
+            <a:r>
+              <a:rPr lang="de-CH" sz="1200" dirty="0">
+                <a:latin typeface="Calibri" panose="020F0502020204030204" pitchFamily="34" charset="0"/>
+              </a:rPr>
+              <a:t>SysP18_Team_10</a:t>
+            </a:r>
+          </a:p>
+        </p:txBody>
+      </p:sp>
+      <p:sp>
+        <p:nvSpPr>
+          <p:cNvPr id="14" name="Textfeld 13"/>
+          <p:cNvSpPr txBox="1"/>
+          <p:nvPr/>
+        </p:nvSpPr>
+        <p:spPr>
+          <a:xfrm>
+            <a:off x="313905" y="1124744"/>
+            <a:ext cx="3492082" cy="523220"/>
+          </a:xfrm>
+          <a:prstGeom prst="rect">
+            <a:avLst/>
+          </a:prstGeom>
+          <a:noFill/>
+        </p:spPr>
+        <p:txBody>
+          <a:bodyPr wrap="square" rtlCol="0">
+            <a:spAutoFit/>
+          </a:bodyPr>
+          <a:lstStyle/>
+          <a:p>
+            <a:r>
+              <a:rPr lang="de-CH" sz="2800" b="1" dirty="0">
+                <a:latin typeface="+mj-lt"/>
+              </a:rPr>
+              <a:t>PCB Layout</a:t>
+            </a:r>
+          </a:p>
+        </p:txBody>
+      </p:sp>
+      <p:sp>
+        <p:nvSpPr>
+          <p:cNvPr id="16" name="Textfeld 15">
+            <a:extLst>
+              <a:ext uri="{FF2B5EF4-FFF2-40B4-BE49-F238E27FC236}">
+                <a16:creationId xmlns:a16="http://schemas.microsoft.com/office/drawing/2014/main" id="{2EBD323C-4D9D-5D42-9645-414FFBB7D04B}"/>
+              </a:ext>
+            </a:extLst>
+          </p:cNvPr>
+          <p:cNvSpPr txBox="1"/>
+          <p:nvPr/>
+        </p:nvSpPr>
+        <p:spPr>
+          <a:xfrm>
+            <a:off x="7840953" y="6542725"/>
+            <a:ext cx="1040671" cy="276999"/>
+          </a:xfrm>
+          <a:prstGeom prst="rect">
+            <a:avLst/>
+          </a:prstGeom>
+          <a:noFill/>
+        </p:spPr>
+        <p:txBody>
+          <a:bodyPr wrap="none" rtlCol="0">
+            <a:spAutoFit/>
+          </a:bodyPr>
+          <a:lstStyle/>
+          <a:p>
+            <a:pPr algn="r"/>
+            <a:r>
+              <a:rPr lang="de-CH" sz="1200" dirty="0">
+                <a:latin typeface="Calibri" panose="020F0502020204030204" pitchFamily="34" charset="0"/>
+              </a:rPr>
+              <a:t>3.  März 2018</a:t>
+            </a:r>
+          </a:p>
+        </p:txBody>
+      </p:sp>
+      <p:pic>
+        <p:nvPicPr>
+          <p:cNvPr id="13" name="Grafik 12">
+            <a:extLst>
+              <a:ext uri="{FF2B5EF4-FFF2-40B4-BE49-F238E27FC236}">
+                <a16:creationId xmlns:a16="http://schemas.microsoft.com/office/drawing/2014/main" id="{EB0EBD4D-1810-472B-BE7B-81553D85DF6E}"/>
+              </a:ext>
+            </a:extLst>
+          </p:cNvPr>
+          <p:cNvPicPr>
+            <a:picLocks noChangeAspect="1"/>
+          </p:cNvPicPr>
+          <p:nvPr/>
+        </p:nvPicPr>
+        <p:blipFill>
+          <a:blip r:embed="rId4">
+            <a:extLst>
+              <a:ext uri="{28A0092B-C50C-407E-A947-70E740481C1C}">
+                <a14:useLocalDpi xmlns:a14="http://schemas.microsoft.com/office/drawing/2010/main" val="0"/>
+              </a:ext>
+            </a:extLst>
+          </a:blip>
+          <a:stretch>
+            <a:fillRect/>
+          </a:stretch>
+        </p:blipFill>
+        <p:spPr>
+          <a:xfrm>
+            <a:off x="1842660" y="1647964"/>
+            <a:ext cx="5448580" cy="4654789"/>
+          </a:xfrm>
+          <a:prstGeom prst="rect">
+            <a:avLst/>
+          </a:prstGeom>
+        </p:spPr>
+      </p:pic>
+    </p:spTree>
+    <p:extLst>
+      <p:ext uri="{BB962C8B-B14F-4D97-AF65-F5344CB8AC3E}">
+        <p14:creationId xmlns:p14="http://schemas.microsoft.com/office/powerpoint/2010/main" val="2565913150"/>
+      </p:ext>
+    </p:extLst>
+  </p:cSld>
+  <p:clrMapOvr>
+    <a:masterClrMapping/>
+  </p:clrMapOvr>
+</p:sld>
+</file>
+
+<file path=ppt/slides/slide8.xml><?xml version="1.0" encoding="utf-8"?>
+<p:sld xmlns:a="http://schemas.openxmlformats.org/drawingml/2006/main" xmlns:r="http://schemas.openxmlformats.org/officeDocument/2006/relationships" xmlns:p="http://schemas.openxmlformats.org/presentationml/2006/main">
+  <p:cSld>
+    <p:spTree>
+      <p:nvGrpSpPr>
+        <p:cNvPr id="1" name=""/>
+        <p:cNvGrpSpPr/>
+        <p:nvPr/>
+      </p:nvGrpSpPr>
+      <p:grpSpPr>
+        <a:xfrm>
+          <a:off x="0" y="0"/>
+          <a:ext cx="0" cy="0"/>
+          <a:chOff x="0" y="0"/>
+          <a:chExt cx="0" cy="0"/>
+        </a:xfrm>
+      </p:grpSpPr>
+      <p:pic>
+        <p:nvPicPr>
+          <p:cNvPr id="12" name="Grafik 11">
+            <a:extLst>
+              <a:ext uri="{FF2B5EF4-FFF2-40B4-BE49-F238E27FC236}">
+                <a16:creationId xmlns:a16="http://schemas.microsoft.com/office/drawing/2014/main" id="{3CAD2387-56CE-894F-B3B7-96EC9F4BCD2B}"/>
+              </a:ext>
+            </a:extLst>
+          </p:cNvPr>
+          <p:cNvPicPr>
+            <a:picLocks noChangeAspect="1"/>
+          </p:cNvPicPr>
+          <p:nvPr/>
+        </p:nvPicPr>
+        <p:blipFill>
+          <a:blip r:embed="rId2">
+            <a:extLst>
+              <a:ext uri="{28A0092B-C50C-407E-A947-70E740481C1C}">
+                <a14:useLocalDpi xmlns:a14="http://schemas.microsoft.com/office/drawing/2010/main" val="0"/>
+              </a:ext>
+            </a:extLst>
+          </a:blip>
+          <a:stretch>
+            <a:fillRect/>
+          </a:stretch>
+        </p:blipFill>
+        <p:spPr>
+          <a:xfrm>
+            <a:off x="0" y="-3571"/>
+            <a:ext cx="1066800" cy="406400"/>
+          </a:xfrm>
+          <a:prstGeom prst="rect">
+            <a:avLst/>
+          </a:prstGeom>
+        </p:spPr>
+      </p:pic>
+      <p:cxnSp>
+        <p:nvCxnSpPr>
+          <p:cNvPr id="5" name="Gerade Verbindung 4"/>
+          <p:cNvCxnSpPr/>
+          <p:nvPr/>
+        </p:nvCxnSpPr>
+        <p:spPr>
+          <a:xfrm>
+            <a:off x="0" y="6525344"/>
+            <a:ext cx="9144000" cy="0"/>
+          </a:xfrm>
+          <a:prstGeom prst="line">
+            <a:avLst/>
+          </a:prstGeom>
+          <a:ln>
+            <a:solidFill>
+              <a:schemeClr val="tx1"/>
+            </a:solidFill>
+          </a:ln>
+        </p:spPr>
+        <p:style>
+          <a:lnRef idx="1">
+            <a:schemeClr val="accent1"/>
+          </a:lnRef>
+          <a:fillRef idx="0">
+            <a:schemeClr val="accent1"/>
+          </a:fillRef>
+          <a:effectRef idx="0">
+            <a:schemeClr val="accent1"/>
+          </a:effectRef>
+          <a:fontRef idx="minor">
+            <a:schemeClr val="tx1"/>
+          </a:fontRef>
+        </p:style>
+      </p:cxnSp>
+      <p:sp>
+        <p:nvSpPr>
+          <p:cNvPr id="6" name="Textfeld 5"/>
+          <p:cNvSpPr txBox="1"/>
+          <p:nvPr/>
+        </p:nvSpPr>
+        <p:spPr>
+          <a:xfrm>
+            <a:off x="287830" y="6542726"/>
+            <a:ext cx="1208792" cy="276999"/>
+          </a:xfrm>
+          <a:prstGeom prst="rect">
+            <a:avLst/>
+          </a:prstGeom>
+          <a:noFill/>
+        </p:spPr>
+        <p:txBody>
+          <a:bodyPr wrap="none" rtlCol="0">
+            <a:spAutoFit/>
+          </a:bodyPr>
+          <a:lstStyle/>
+          <a:p>
+            <a:r>
+              <a:rPr lang="de-CH" sz="1200" dirty="0">
+                <a:latin typeface="Calibri" panose="020F0502020204030204" pitchFamily="34" charset="0"/>
+              </a:rPr>
+              <a:t>Meilenstein_M2</a:t>
+            </a:r>
+          </a:p>
+        </p:txBody>
+      </p:sp>
+      <p:sp>
+        <p:nvSpPr>
+          <p:cNvPr id="8" name="Textfeld 7"/>
+          <p:cNvSpPr txBox="1"/>
+          <p:nvPr/>
+        </p:nvSpPr>
+        <p:spPr>
+          <a:xfrm>
+            <a:off x="3627204" y="6542724"/>
+            <a:ext cx="1800200" cy="276999"/>
+          </a:xfrm>
+          <a:prstGeom prst="rect">
+            <a:avLst/>
+          </a:prstGeom>
+          <a:noFill/>
+        </p:spPr>
+        <p:txBody>
+          <a:bodyPr wrap="square" rtlCol="0">
+            <a:spAutoFit/>
+          </a:bodyPr>
+          <a:lstStyle/>
+          <a:p>
+            <a:pPr algn="ctr"/>
+            <a:r>
+              <a:rPr lang="de-CH" sz="1200" dirty="0">
+                <a:latin typeface="Calibri" panose="020F0502020204030204" pitchFamily="34" charset="0"/>
+              </a:rPr>
+              <a:t>Seite 1/??</a:t>
+            </a:r>
+          </a:p>
+        </p:txBody>
+      </p:sp>
+      <p:cxnSp>
+        <p:nvCxnSpPr>
+          <p:cNvPr id="9" name="Gerade Verbindung 4"/>
+          <p:cNvCxnSpPr/>
+          <p:nvPr/>
+        </p:nvCxnSpPr>
+        <p:spPr>
+          <a:xfrm>
+            <a:off x="-5050" y="421597"/>
+            <a:ext cx="9144000" cy="0"/>
+          </a:xfrm>
+          <a:prstGeom prst="line">
+            <a:avLst/>
+          </a:prstGeom>
+          <a:ln>
+            <a:solidFill>
+              <a:schemeClr val="tx1"/>
+            </a:solidFill>
+          </a:ln>
+        </p:spPr>
+        <p:style>
+          <a:lnRef idx="1">
+            <a:schemeClr val="accent1"/>
+          </a:lnRef>
+          <a:fillRef idx="0">
+            <a:schemeClr val="accent1"/>
+          </a:fillRef>
+          <a:effectRef idx="0">
+            <a:schemeClr val="accent1"/>
+          </a:effectRef>
+          <a:fontRef idx="minor">
+            <a:schemeClr val="tx1"/>
+          </a:fontRef>
+        </p:style>
+      </p:cxnSp>
+      <p:sp>
+        <p:nvSpPr>
+          <p:cNvPr id="10" name="Textfeld 9"/>
+          <p:cNvSpPr txBox="1"/>
+          <p:nvPr/>
+        </p:nvSpPr>
+        <p:spPr>
+          <a:xfrm>
+            <a:off x="7615828" y="144598"/>
+            <a:ext cx="1265796" cy="276999"/>
+          </a:xfrm>
+          <a:prstGeom prst="rect">
+            <a:avLst/>
+          </a:prstGeom>
+          <a:noFill/>
+        </p:spPr>
+        <p:txBody>
+          <a:bodyPr wrap="none" rtlCol="0">
+            <a:spAutoFit/>
+          </a:bodyPr>
+          <a:lstStyle/>
+          <a:p>
+            <a:pPr algn="r"/>
+            <a:r>
+              <a:rPr lang="de-CH" sz="1200" dirty="0">
+                <a:latin typeface="Calibri" panose="020F0502020204030204" pitchFamily="34" charset="0"/>
+              </a:rPr>
+              <a:t>SysP18_Team_10</a:t>
+            </a:r>
+          </a:p>
+        </p:txBody>
+      </p:sp>
+      <p:sp>
+        <p:nvSpPr>
+          <p:cNvPr id="14" name="Textfeld 13"/>
+          <p:cNvSpPr txBox="1"/>
+          <p:nvPr/>
+        </p:nvSpPr>
+        <p:spPr>
+          <a:xfrm>
+            <a:off x="313905" y="1124744"/>
+            <a:ext cx="3492082" cy="523220"/>
+          </a:xfrm>
+          <a:prstGeom prst="rect">
+            <a:avLst/>
+          </a:prstGeom>
+          <a:noFill/>
+        </p:spPr>
+        <p:txBody>
+          <a:bodyPr wrap="square" rtlCol="0">
+            <a:spAutoFit/>
+          </a:bodyPr>
+          <a:lstStyle/>
+          <a:p>
+            <a:r>
+              <a:rPr lang="de-CH" sz="2800" b="1" dirty="0">
+                <a:latin typeface="+mj-lt"/>
+              </a:rPr>
+              <a:t>PCB 3D Modell</a:t>
+            </a:r>
+          </a:p>
+        </p:txBody>
+      </p:sp>
+      <p:sp>
+        <p:nvSpPr>
+          <p:cNvPr id="13" name="Textfeld 12">
+            <a:extLst>
+              <a:ext uri="{FF2B5EF4-FFF2-40B4-BE49-F238E27FC236}">
+                <a16:creationId xmlns:a16="http://schemas.microsoft.com/office/drawing/2014/main" id="{B9888DC2-2AAA-F34E-A3D1-EBAE77A31728}"/>
+              </a:ext>
+            </a:extLst>
+          </p:cNvPr>
+          <p:cNvSpPr txBox="1"/>
+          <p:nvPr/>
+        </p:nvSpPr>
+        <p:spPr>
+          <a:xfrm>
+            <a:off x="7840953" y="6542725"/>
+            <a:ext cx="1040671" cy="276999"/>
+          </a:xfrm>
+          <a:prstGeom prst="rect">
+            <a:avLst/>
+          </a:prstGeom>
+          <a:noFill/>
+        </p:spPr>
+        <p:txBody>
+          <a:bodyPr wrap="none" rtlCol="0">
+            <a:spAutoFit/>
+          </a:bodyPr>
+          <a:lstStyle/>
+          <a:p>
+            <a:pPr algn="r"/>
+            <a:r>
+              <a:rPr lang="de-CH" sz="1200" dirty="0">
+                <a:latin typeface="Calibri" panose="020F0502020204030204" pitchFamily="34" charset="0"/>
+              </a:rPr>
+              <a:t>3.  März 2018</a:t>
+            </a:r>
+          </a:p>
+        </p:txBody>
+      </p:sp>
+    </p:spTree>
+    <p:extLst>
+      <p:ext uri="{BB962C8B-B14F-4D97-AF65-F5344CB8AC3E}">
+        <p14:creationId xmlns:p14="http://schemas.microsoft.com/office/powerpoint/2010/main" val="721402769"/>
+      </p:ext>
+    </p:extLst>
+  </p:cSld>
+  <p:clrMapOvr>
+    <a:masterClrMapping/>
+  </p:clrMapOvr>
+</p:sld>
+</file>
+
+<file path=ppt/slides/slide9.xml><?xml version="1.0" encoding="utf-8"?>
+<p:sld xmlns:a="http://schemas.openxmlformats.org/drawingml/2006/main" xmlns:r="http://schemas.openxmlformats.org/officeDocument/2006/relationships" xmlns:p="http://schemas.openxmlformats.org/presentationml/2006/main">
+  <p:cSld>
+    <p:spTree>
+      <p:nvGrpSpPr>
+        <p:cNvPr id="1" name=""/>
+        <p:cNvGrpSpPr/>
+        <p:nvPr/>
+      </p:nvGrpSpPr>
+      <p:grpSpPr>
+        <a:xfrm>
+          <a:off x="0" y="0"/>
+          <a:ext cx="0" cy="0"/>
+          <a:chOff x="0" y="0"/>
+          <a:chExt cx="0" cy="0"/>
+        </a:xfrm>
+      </p:grpSpPr>
+      <p:pic>
+        <p:nvPicPr>
+          <p:cNvPr id="12" name="Grafik 11">
+            <a:extLst>
+              <a:ext uri="{FF2B5EF4-FFF2-40B4-BE49-F238E27FC236}">
+                <a16:creationId xmlns:a16="http://schemas.microsoft.com/office/drawing/2014/main" id="{63518878-B2F8-9E42-B6D4-7C199E65E901}"/>
+              </a:ext>
+            </a:extLst>
+          </p:cNvPr>
+          <p:cNvPicPr>
+            <a:picLocks noChangeAspect="1"/>
+          </p:cNvPicPr>
+          <p:nvPr/>
+        </p:nvPicPr>
+        <p:blipFill>
+          <a:blip r:embed="rId3">
+            <a:extLst>
+              <a:ext uri="{28A0092B-C50C-407E-A947-70E740481C1C}">
+                <a14:useLocalDpi xmlns:a14="http://schemas.microsoft.com/office/drawing/2010/main" val="0"/>
+              </a:ext>
+            </a:extLst>
+          </a:blip>
+          <a:stretch>
+            <a:fillRect/>
+          </a:stretch>
+        </p:blipFill>
+        <p:spPr>
+          <a:xfrm>
+            <a:off x="0" y="-3571"/>
+            <a:ext cx="1066800" cy="406400"/>
+          </a:xfrm>
+          <a:prstGeom prst="rect">
+            <a:avLst/>
+          </a:prstGeom>
+        </p:spPr>
+      </p:pic>
+      <p:cxnSp>
+        <p:nvCxnSpPr>
+          <p:cNvPr id="5" name="Gerade Verbindung 4"/>
+          <p:cNvCxnSpPr/>
+          <p:nvPr/>
+        </p:nvCxnSpPr>
+        <p:spPr>
+          <a:xfrm>
+            <a:off x="0" y="6525344"/>
+            <a:ext cx="9144000" cy="0"/>
+          </a:xfrm>
+          <a:prstGeom prst="line">
+            <a:avLst/>
+          </a:prstGeom>
+          <a:ln>
+            <a:solidFill>
+              <a:schemeClr val="tx1"/>
+            </a:solidFill>
+          </a:ln>
+        </p:spPr>
+        <p:style>
+          <a:lnRef idx="1">
+            <a:schemeClr val="accent1"/>
+          </a:lnRef>
+          <a:fillRef idx="0">
+            <a:schemeClr val="accent1"/>
+          </a:fillRef>
+          <a:effectRef idx="0">
+            <a:schemeClr val="accent1"/>
+          </a:effectRef>
+          <a:fontRef idx="minor">
+            <a:schemeClr val="tx1"/>
+          </a:fontRef>
+        </p:style>
+      </p:cxnSp>
+      <p:sp>
+        <p:nvSpPr>
+          <p:cNvPr id="6" name="Textfeld 5"/>
+          <p:cNvSpPr txBox="1"/>
+          <p:nvPr/>
+        </p:nvSpPr>
+        <p:spPr>
+          <a:xfrm>
+            <a:off x="287830" y="6542726"/>
+            <a:ext cx="1208792" cy="276999"/>
+          </a:xfrm>
+          <a:prstGeom prst="rect">
+            <a:avLst/>
+          </a:prstGeom>
+          <a:noFill/>
+        </p:spPr>
+        <p:txBody>
+          <a:bodyPr wrap="none" rtlCol="0">
+            <a:spAutoFit/>
+          </a:bodyPr>
+          <a:lstStyle/>
+          <a:p>
+            <a:r>
+              <a:rPr lang="de-CH" sz="1200" dirty="0">
+                <a:latin typeface="Calibri" panose="020F0502020204030204" pitchFamily="34" charset="0"/>
+              </a:rPr>
+              <a:t>Meilenstein_M2</a:t>
+            </a:r>
+          </a:p>
+        </p:txBody>
+      </p:sp>
+      <p:sp>
+        <p:nvSpPr>
+          <p:cNvPr id="8" name="Textfeld 7"/>
+          <p:cNvSpPr txBox="1"/>
+          <p:nvPr/>
+        </p:nvSpPr>
+        <p:spPr>
+          <a:xfrm>
+            <a:off x="3627204" y="6542724"/>
+            <a:ext cx="1800200" cy="276999"/>
+          </a:xfrm>
+          <a:prstGeom prst="rect">
+            <a:avLst/>
+          </a:prstGeom>
+          <a:noFill/>
+        </p:spPr>
+        <p:txBody>
+          <a:bodyPr wrap="square" rtlCol="0">
+            <a:spAutoFit/>
+          </a:bodyPr>
+          <a:lstStyle/>
+          <a:p>
+            <a:pPr algn="ctr"/>
+            <a:r>
+              <a:rPr lang="de-CH" sz="1200" dirty="0">
+                <a:latin typeface="Calibri" panose="020F0502020204030204" pitchFamily="34" charset="0"/>
+              </a:rPr>
+              <a:t>Seite 2/??</a:t>
+            </a:r>
+          </a:p>
+        </p:txBody>
+      </p:sp>
+      <p:cxnSp>
+        <p:nvCxnSpPr>
+          <p:cNvPr id="9" name="Gerade Verbindung 4"/>
+          <p:cNvCxnSpPr/>
+          <p:nvPr/>
+        </p:nvCxnSpPr>
+        <p:spPr>
+          <a:xfrm>
+            <a:off x="-5050" y="421597"/>
+            <a:ext cx="9144000" cy="0"/>
+          </a:xfrm>
+          <a:prstGeom prst="line">
+            <a:avLst/>
+          </a:prstGeom>
+          <a:ln>
+            <a:solidFill>
+              <a:schemeClr val="tx1"/>
+            </a:solidFill>
+          </a:ln>
+        </p:spPr>
+        <p:style>
+          <a:lnRef idx="1">
+            <a:schemeClr val="accent1"/>
+          </a:lnRef>
+          <a:fillRef idx="0">
+            <a:schemeClr val="accent1"/>
+          </a:fillRef>
+          <a:effectRef idx="0">
+            <a:schemeClr val="accent1"/>
+          </a:effectRef>
+          <a:fontRef idx="minor">
+            <a:schemeClr val="tx1"/>
+          </a:fontRef>
+        </p:style>
+      </p:cxnSp>
+      <p:sp>
+        <p:nvSpPr>
+          <p:cNvPr id="10" name="Textfeld 9"/>
+          <p:cNvSpPr txBox="1"/>
+          <p:nvPr/>
+        </p:nvSpPr>
+        <p:spPr>
+          <a:xfrm>
+            <a:off x="7615828" y="144598"/>
+            <a:ext cx="1265796" cy="276999"/>
+          </a:xfrm>
+          <a:prstGeom prst="rect">
+            <a:avLst/>
+          </a:prstGeom>
+          <a:noFill/>
+        </p:spPr>
+        <p:txBody>
+          <a:bodyPr wrap="none" rtlCol="0">
+            <a:spAutoFit/>
+          </a:bodyPr>
+          <a:lstStyle/>
+          <a:p>
+            <a:pPr algn="r"/>
+            <a:r>
+              <a:rPr lang="de-CH" sz="1200" dirty="0">
+                <a:latin typeface="Calibri" panose="020F0502020204030204" pitchFamily="34" charset="0"/>
+              </a:rPr>
+              <a:t>SysP18_Team_10</a:t>
+            </a:r>
+          </a:p>
+        </p:txBody>
+      </p:sp>
+      <p:sp>
+        <p:nvSpPr>
+          <p:cNvPr id="14" name="Textfeld 13"/>
+          <p:cNvSpPr txBox="1"/>
+          <p:nvPr/>
+        </p:nvSpPr>
+        <p:spPr>
+          <a:xfrm>
+            <a:off x="390486" y="452675"/>
+            <a:ext cx="4176464" cy="523220"/>
+          </a:xfrm>
+          <a:prstGeom prst="rect">
+            <a:avLst/>
+          </a:prstGeom>
+          <a:noFill/>
+        </p:spPr>
+        <p:txBody>
+          <a:bodyPr wrap="square" rtlCol="0">
+            <a:spAutoFit/>
+          </a:bodyPr>
+          <a:lstStyle/>
+          <a:p>
+            <a:r>
+              <a:rPr lang="de-CH" sz="2800" b="1" dirty="0">
+                <a:latin typeface="+mj-lt"/>
+              </a:rPr>
+              <a:t>Motorentreiber Schema</a:t>
+            </a:r>
+          </a:p>
+        </p:txBody>
+      </p:sp>
+      <p:sp>
+        <p:nvSpPr>
+          <p:cNvPr id="16" name="Textfeld 15">
+            <a:extLst>
+              <a:ext uri="{FF2B5EF4-FFF2-40B4-BE49-F238E27FC236}">
+                <a16:creationId xmlns:a16="http://schemas.microsoft.com/office/drawing/2014/main" id="{2EBD323C-4D9D-5D42-9645-414FFBB7D04B}"/>
+              </a:ext>
+            </a:extLst>
+          </p:cNvPr>
+          <p:cNvSpPr txBox="1"/>
+          <p:nvPr/>
+        </p:nvSpPr>
+        <p:spPr>
+          <a:xfrm>
+            <a:off x="7840953" y="6542725"/>
+            <a:ext cx="1040671" cy="276999"/>
+          </a:xfrm>
+          <a:prstGeom prst="rect">
+            <a:avLst/>
+          </a:prstGeom>
+          <a:noFill/>
+        </p:spPr>
+        <p:txBody>
+          <a:bodyPr wrap="none" rtlCol="0">
+            <a:spAutoFit/>
+          </a:bodyPr>
+          <a:lstStyle/>
+          <a:p>
+            <a:pPr algn="r"/>
+            <a:r>
+              <a:rPr lang="de-CH" sz="1200" dirty="0">
+                <a:latin typeface="Calibri" panose="020F0502020204030204" pitchFamily="34" charset="0"/>
+              </a:rPr>
+              <a:t>3.  März 2018</a:t>
+            </a:r>
+          </a:p>
+        </p:txBody>
+      </p:sp>
+      <p:pic>
+        <p:nvPicPr>
+          <p:cNvPr id="3" name="Grafik 2">
+            <a:extLst>
+              <a:ext uri="{FF2B5EF4-FFF2-40B4-BE49-F238E27FC236}">
+                <a16:creationId xmlns:a16="http://schemas.microsoft.com/office/drawing/2014/main" id="{DC4409DB-74CD-464E-8325-21620F50EA5F}"/>
+              </a:ext>
+            </a:extLst>
+          </p:cNvPr>
+          <p:cNvPicPr>
+            <a:picLocks noChangeAspect="1"/>
+          </p:cNvPicPr>
+          <p:nvPr/>
+        </p:nvPicPr>
+        <p:blipFill>
+          <a:blip r:embed="rId4">
+            <a:extLst>
+              <a:ext uri="{28A0092B-C50C-407E-A947-70E740481C1C}">
+                <a14:useLocalDpi xmlns:a14="http://schemas.microsoft.com/office/drawing/2010/main" val="0"/>
+              </a:ext>
+            </a:extLst>
+          </a:blip>
+          <a:stretch>
+            <a:fillRect/>
+          </a:stretch>
+        </p:blipFill>
+        <p:spPr>
+          <a:xfrm>
+            <a:off x="312112" y="975896"/>
+            <a:ext cx="8289445" cy="5460508"/>
+          </a:xfrm>
+          <a:prstGeom prst="rect">
+            <a:avLst/>
+          </a:prstGeom>
+        </p:spPr>
+      </p:pic>
+    </p:spTree>
+    <p:extLst>
+      <p:ext uri="{BB962C8B-B14F-4D97-AF65-F5344CB8AC3E}">
+        <p14:creationId xmlns:p14="http://schemas.microsoft.com/office/powerpoint/2010/main" val="4171095930"/>
       </p:ext>
     </p:extLst>
   </p:cSld>

</xml_diff>